<commit_message>
figure and documentation updates
</commit_message>
<xml_diff>
--- a/Figures/cov_eg.pptx
+++ b/Figures/cov_eg.pptx
@@ -197,7 +197,7 @@
           <a:p>
             <a:fld id="{2188756B-90D5-3F48-98F9-EB9C28F98449}" type="datetimeFigureOut">
               <a:rPr lang="en-US" smtClean="0"/>
-              <a:t>9/2/24</a:t>
+              <a:t>8/29/25</a:t>
             </a:fld>
             <a:endParaRPr lang="en-US"/>
           </a:p>
@@ -698,7 +698,7 @@
           <a:p>
             <a:fld id="{288AC486-9019-F647-A33F-E25ACA48822C}" type="datetimeFigureOut">
               <a:rPr lang="en-US" smtClean="0"/>
-              <a:t>9/2/24</a:t>
+              <a:t>8/29/25</a:t>
             </a:fld>
             <a:endParaRPr lang="en-US"/>
           </a:p>
@@ -898,7 +898,7 @@
           <a:p>
             <a:fld id="{288AC486-9019-F647-A33F-E25ACA48822C}" type="datetimeFigureOut">
               <a:rPr lang="en-US" smtClean="0"/>
-              <a:t>9/2/24</a:t>
+              <a:t>8/29/25</a:t>
             </a:fld>
             <a:endParaRPr lang="en-US"/>
           </a:p>
@@ -1108,7 +1108,7 @@
           <a:p>
             <a:fld id="{288AC486-9019-F647-A33F-E25ACA48822C}" type="datetimeFigureOut">
               <a:rPr lang="en-US" smtClean="0"/>
-              <a:t>9/2/24</a:t>
+              <a:t>8/29/25</a:t>
             </a:fld>
             <a:endParaRPr lang="en-US"/>
           </a:p>
@@ -1308,7 +1308,7 @@
           <a:p>
             <a:fld id="{288AC486-9019-F647-A33F-E25ACA48822C}" type="datetimeFigureOut">
               <a:rPr lang="en-US" smtClean="0"/>
-              <a:t>9/2/24</a:t>
+              <a:t>8/29/25</a:t>
             </a:fld>
             <a:endParaRPr lang="en-US"/>
           </a:p>
@@ -1584,7 +1584,7 @@
           <a:p>
             <a:fld id="{288AC486-9019-F647-A33F-E25ACA48822C}" type="datetimeFigureOut">
               <a:rPr lang="en-US" smtClean="0"/>
-              <a:t>9/2/24</a:t>
+              <a:t>8/29/25</a:t>
             </a:fld>
             <a:endParaRPr lang="en-US"/>
           </a:p>
@@ -1852,7 +1852,7 @@
           <a:p>
             <a:fld id="{288AC486-9019-F647-A33F-E25ACA48822C}" type="datetimeFigureOut">
               <a:rPr lang="en-US" smtClean="0"/>
-              <a:t>9/2/24</a:t>
+              <a:t>8/29/25</a:t>
             </a:fld>
             <a:endParaRPr lang="en-US"/>
           </a:p>
@@ -2267,7 +2267,7 @@
           <a:p>
             <a:fld id="{288AC486-9019-F647-A33F-E25ACA48822C}" type="datetimeFigureOut">
               <a:rPr lang="en-US" smtClean="0"/>
-              <a:t>9/2/24</a:t>
+              <a:t>8/29/25</a:t>
             </a:fld>
             <a:endParaRPr lang="en-US"/>
           </a:p>
@@ -2409,7 +2409,7 @@
           <a:p>
             <a:fld id="{288AC486-9019-F647-A33F-E25ACA48822C}" type="datetimeFigureOut">
               <a:rPr lang="en-US" smtClean="0"/>
-              <a:t>9/2/24</a:t>
+              <a:t>8/29/25</a:t>
             </a:fld>
             <a:endParaRPr lang="en-US"/>
           </a:p>
@@ -2522,7 +2522,7 @@
           <a:p>
             <a:fld id="{288AC486-9019-F647-A33F-E25ACA48822C}" type="datetimeFigureOut">
               <a:rPr lang="en-US" smtClean="0"/>
-              <a:t>9/2/24</a:t>
+              <a:t>8/29/25</a:t>
             </a:fld>
             <a:endParaRPr lang="en-US"/>
           </a:p>
@@ -2835,7 +2835,7 @@
           <a:p>
             <a:fld id="{288AC486-9019-F647-A33F-E25ACA48822C}" type="datetimeFigureOut">
               <a:rPr lang="en-US" smtClean="0"/>
-              <a:t>9/2/24</a:t>
+              <a:t>8/29/25</a:t>
             </a:fld>
             <a:endParaRPr lang="en-US"/>
           </a:p>
@@ -3124,7 +3124,7 @@
           <a:p>
             <a:fld id="{288AC486-9019-F647-A33F-E25ACA48822C}" type="datetimeFigureOut">
               <a:rPr lang="en-US" smtClean="0"/>
-              <a:t>9/2/24</a:t>
+              <a:t>8/29/25</a:t>
             </a:fld>
             <a:endParaRPr lang="en-US"/>
           </a:p>
@@ -3367,7 +3367,7 @@
           <a:p>
             <a:fld id="{288AC486-9019-F647-A33F-E25ACA48822C}" type="datetimeFigureOut">
               <a:rPr lang="en-US" smtClean="0"/>
-              <a:t>9/2/24</a:t>
+              <a:t>8/29/25</a:t>
             </a:fld>
             <a:endParaRPr lang="en-US"/>
           </a:p>
@@ -3784,1735 +3784,1772 @@
           <a:chExt cx="0" cy="0"/>
         </a:xfrm>
       </p:grpSpPr>
-      <p:pic>
-        <p:nvPicPr>
-          <p:cNvPr id="4" name="Picture 3" descr="A silhouette of a deer&#10;&#10;Description automatically generated">
-            <a:extLst>
-              <a:ext uri="{FF2B5EF4-FFF2-40B4-BE49-F238E27FC236}">
-                <a16:creationId xmlns:a16="http://schemas.microsoft.com/office/drawing/2014/main" id="{BFD4D87D-5FCC-F075-FFE2-E2993389FE24}"/>
-              </a:ext>
-            </a:extLst>
-          </p:cNvPr>
-          <p:cNvPicPr>
-            <a:picLocks noChangeAspect="1"/>
-          </p:cNvPicPr>
+      <p:grpSp>
+        <p:nvGrpSpPr>
+          <p:cNvPr id="2" name="Group 1">
+            <a:extLst>
+              <a:ext uri="{FF2B5EF4-FFF2-40B4-BE49-F238E27FC236}">
+                <a16:creationId xmlns:a16="http://schemas.microsoft.com/office/drawing/2014/main" id="{3EC1F919-FF07-50FA-68BA-1C935C9AAABF}"/>
+              </a:ext>
+            </a:extLst>
+          </p:cNvPr>
+          <p:cNvGrpSpPr/>
           <p:nvPr/>
-        </p:nvPicPr>
-        <p:blipFill>
-          <a:blip r:embed="rId3"/>
-          <a:stretch>
-            <a:fillRect/>
-          </a:stretch>
-        </p:blipFill>
-        <p:spPr>
-          <a:xfrm>
-            <a:off x="1042719" y="427241"/>
-            <a:ext cx="1580827" cy="1057519"/>
-          </a:xfrm>
-          <a:prstGeom prst="rect">
-            <a:avLst/>
-          </a:prstGeom>
-        </p:spPr>
-      </p:pic>
-      <p:pic>
-        <p:nvPicPr>
-          <p:cNvPr id="5" name="Picture 4" descr="A silhouette of a deer&#10;&#10;Description automatically generated">
-            <a:extLst>
-              <a:ext uri="{FF2B5EF4-FFF2-40B4-BE49-F238E27FC236}">
-                <a16:creationId xmlns:a16="http://schemas.microsoft.com/office/drawing/2014/main" id="{5DC55B3D-B4AD-B971-7238-C3E6C3F8ADE3}"/>
-              </a:ext>
-            </a:extLst>
-          </p:cNvPr>
-          <p:cNvPicPr>
-            <a:picLocks noChangeAspect="1"/>
-          </p:cNvPicPr>
-          <p:nvPr/>
-        </p:nvPicPr>
-        <p:blipFill>
-          <a:blip r:embed="rId3"/>
-          <a:stretch>
-            <a:fillRect/>
-          </a:stretch>
-        </p:blipFill>
-        <p:spPr>
-          <a:xfrm>
-            <a:off x="3287862" y="422431"/>
-            <a:ext cx="1580827" cy="1057519"/>
-          </a:xfrm>
-          <a:prstGeom prst="rect">
-            <a:avLst/>
-          </a:prstGeom>
-        </p:spPr>
-      </p:pic>
-      <p:pic>
-        <p:nvPicPr>
-          <p:cNvPr id="6" name="Picture 5" descr="A silhouette of a deer&#10;&#10;Description automatically generated">
-            <a:extLst>
-              <a:ext uri="{FF2B5EF4-FFF2-40B4-BE49-F238E27FC236}">
-                <a16:creationId xmlns:a16="http://schemas.microsoft.com/office/drawing/2014/main" id="{8C2AE8C2-7A76-7525-A8DD-CF35913DB3EA}"/>
-              </a:ext>
-            </a:extLst>
-          </p:cNvPr>
-          <p:cNvPicPr>
-            <a:picLocks noChangeAspect="1"/>
-          </p:cNvPicPr>
-          <p:nvPr/>
-        </p:nvPicPr>
-        <p:blipFill>
-          <a:blip r:embed="rId4"/>
-          <a:stretch>
-            <a:fillRect/>
-          </a:stretch>
-        </p:blipFill>
-        <p:spPr>
-          <a:xfrm>
-            <a:off x="463009" y="2158828"/>
-            <a:ext cx="964902" cy="1038234"/>
-          </a:xfrm>
-          <a:prstGeom prst="rect">
-            <a:avLst/>
-          </a:prstGeom>
-        </p:spPr>
-      </p:pic>
-      <p:pic>
-        <p:nvPicPr>
-          <p:cNvPr id="7" name="Picture 6" descr="A silhouette of a deer&#10;&#10;Description automatically generated">
-            <a:extLst>
-              <a:ext uri="{FF2B5EF4-FFF2-40B4-BE49-F238E27FC236}">
-                <a16:creationId xmlns:a16="http://schemas.microsoft.com/office/drawing/2014/main" id="{9EDA73FC-1662-C5DF-7C05-B6E4ACE9AD39}"/>
-              </a:ext>
-            </a:extLst>
-          </p:cNvPr>
-          <p:cNvPicPr>
-            <a:picLocks noChangeAspect="1"/>
-          </p:cNvPicPr>
-          <p:nvPr/>
-        </p:nvPicPr>
-        <p:blipFill>
-          <a:blip r:embed="rId4"/>
-          <a:stretch>
-            <a:fillRect/>
-          </a:stretch>
-        </p:blipFill>
-        <p:spPr>
-          <a:xfrm>
-            <a:off x="4576198" y="2153307"/>
-            <a:ext cx="964902" cy="1038234"/>
-          </a:xfrm>
-          <a:prstGeom prst="rect">
-            <a:avLst/>
-          </a:prstGeom>
-        </p:spPr>
-      </p:pic>
-      <p:pic>
-        <p:nvPicPr>
-          <p:cNvPr id="8" name="Picture 7" descr="A black background with a black square&#10;&#10;Description automatically generated with medium confidence">
-            <a:extLst>
-              <a:ext uri="{FF2B5EF4-FFF2-40B4-BE49-F238E27FC236}">
-                <a16:creationId xmlns:a16="http://schemas.microsoft.com/office/drawing/2014/main" id="{DE0BD878-AF74-DC2F-5984-AE5275F2E2F7}"/>
-              </a:ext>
-            </a:extLst>
-          </p:cNvPr>
-          <p:cNvPicPr>
-            <a:picLocks noChangeAspect="1"/>
-          </p:cNvPicPr>
-          <p:nvPr/>
-        </p:nvPicPr>
-        <p:blipFill>
-          <a:blip r:embed="rId5"/>
-          <a:stretch>
-            <a:fillRect/>
-          </a:stretch>
-        </p:blipFill>
-        <p:spPr>
-          <a:xfrm>
-            <a:off x="1273700" y="3804784"/>
-            <a:ext cx="1371951" cy="1399281"/>
-          </a:xfrm>
-          <a:prstGeom prst="rect">
-            <a:avLst/>
-          </a:prstGeom>
-        </p:spPr>
-      </p:pic>
-      <p:pic>
-        <p:nvPicPr>
-          <p:cNvPr id="9" name="Picture 8" descr="A black background with a black square&#10;&#10;Description automatically generated with medium confidence">
-            <a:extLst>
-              <a:ext uri="{FF2B5EF4-FFF2-40B4-BE49-F238E27FC236}">
-                <a16:creationId xmlns:a16="http://schemas.microsoft.com/office/drawing/2014/main" id="{2693E495-9CC5-E868-5560-0D1CC6B08B29}"/>
-              </a:ext>
-            </a:extLst>
-          </p:cNvPr>
-          <p:cNvPicPr>
-            <a:picLocks noChangeAspect="1"/>
-          </p:cNvPicPr>
-          <p:nvPr/>
-        </p:nvPicPr>
-        <p:blipFill>
-          <a:blip r:embed="rId5"/>
-          <a:stretch>
-            <a:fillRect/>
-          </a:stretch>
-        </p:blipFill>
-        <p:spPr>
-          <a:xfrm>
-            <a:off x="3455400" y="3834184"/>
-            <a:ext cx="1371951" cy="1399281"/>
-          </a:xfrm>
-          <a:prstGeom prst="rect">
-            <a:avLst/>
-          </a:prstGeom>
-        </p:spPr>
-      </p:pic>
-      <p:cxnSp>
-        <p:nvCxnSpPr>
-          <p:cNvPr id="13" name="Curved Connector 12">
-            <a:extLst>
-              <a:ext uri="{FF2B5EF4-FFF2-40B4-BE49-F238E27FC236}">
-                <a16:creationId xmlns:a16="http://schemas.microsoft.com/office/drawing/2014/main" id="{21E1DD74-15EC-4044-4F1D-B1CF9BA9D438}"/>
-              </a:ext>
-            </a:extLst>
-          </p:cNvPr>
-          <p:cNvCxnSpPr>
-            <a:cxnSpLocks/>
-          </p:cNvCxnSpPr>
-          <p:nvPr/>
-        </p:nvCxnSpPr>
-        <p:spPr>
-          <a:xfrm rot="10800000" flipV="1">
-            <a:off x="460057" y="931004"/>
-            <a:ext cx="533991" cy="1708102"/>
-          </a:xfrm>
-          <a:prstGeom prst="curvedConnector3">
-            <a:avLst>
-              <a:gd name="adj1" fmla="val 165525"/>
-            </a:avLst>
-          </a:prstGeom>
-          <a:ln w="44450">
-            <a:solidFill>
-              <a:schemeClr val="accent2">
-                <a:lumMod val="60000"/>
-                <a:lumOff val="40000"/>
-              </a:schemeClr>
-            </a:solidFill>
-            <a:tailEnd type="triangle"/>
-          </a:ln>
-        </p:spPr>
-        <p:style>
-          <a:lnRef idx="2">
-            <a:schemeClr val="accent1"/>
-          </a:lnRef>
-          <a:fillRef idx="0">
-            <a:schemeClr val="accent1"/>
-          </a:fillRef>
-          <a:effectRef idx="1">
-            <a:schemeClr val="accent1"/>
-          </a:effectRef>
-          <a:fontRef idx="minor">
-            <a:schemeClr val="tx1"/>
-          </a:fontRef>
-        </p:style>
-      </p:cxnSp>
-      <p:cxnSp>
-        <p:nvCxnSpPr>
-          <p:cNvPr id="18" name="Straight Arrow Connector 17">
-            <a:extLst>
-              <a:ext uri="{FF2B5EF4-FFF2-40B4-BE49-F238E27FC236}">
-                <a16:creationId xmlns:a16="http://schemas.microsoft.com/office/drawing/2014/main" id="{7297CC85-20F1-2A11-CA8E-7E4EE5C3DAC6}"/>
-              </a:ext>
-            </a:extLst>
-          </p:cNvPr>
-          <p:cNvCxnSpPr>
-            <a:cxnSpLocks/>
-            <a:endCxn id="6" idx="0"/>
-          </p:cNvCxnSpPr>
-          <p:nvPr/>
-        </p:nvCxnSpPr>
-        <p:spPr>
-          <a:xfrm flipH="1">
-            <a:off x="945460" y="1387821"/>
-            <a:ext cx="488286" cy="771007"/>
-          </a:xfrm>
-          <a:prstGeom prst="straightConnector1">
-            <a:avLst/>
-          </a:prstGeom>
-          <a:ln w="44450">
-            <a:solidFill>
-              <a:schemeClr val="accent5">
-                <a:lumMod val="40000"/>
-                <a:lumOff val="60000"/>
-              </a:schemeClr>
-            </a:solidFill>
-            <a:tailEnd type="triangle"/>
-          </a:ln>
-        </p:spPr>
-        <p:style>
-          <a:lnRef idx="2">
-            <a:schemeClr val="accent1"/>
-          </a:lnRef>
-          <a:fillRef idx="0">
-            <a:schemeClr val="accent1"/>
-          </a:fillRef>
-          <a:effectRef idx="1">
-            <a:schemeClr val="accent1"/>
-          </a:effectRef>
-          <a:fontRef idx="minor">
-            <a:schemeClr val="tx1"/>
-          </a:fontRef>
-        </p:style>
-      </p:cxnSp>
-      <p:cxnSp>
-        <p:nvCxnSpPr>
-          <p:cNvPr id="19" name="Straight Arrow Connector 18">
-            <a:extLst>
-              <a:ext uri="{FF2B5EF4-FFF2-40B4-BE49-F238E27FC236}">
-                <a16:creationId xmlns:a16="http://schemas.microsoft.com/office/drawing/2014/main" id="{8C19E5D1-4BD2-D597-1AED-8DCF593E09B9}"/>
-              </a:ext>
-            </a:extLst>
-          </p:cNvPr>
-          <p:cNvCxnSpPr>
-            <a:cxnSpLocks/>
-          </p:cNvCxnSpPr>
-          <p:nvPr/>
-        </p:nvCxnSpPr>
-        <p:spPr>
-          <a:xfrm>
-            <a:off x="4367575" y="1479950"/>
-            <a:ext cx="501114" cy="800782"/>
-          </a:xfrm>
-          <a:prstGeom prst="straightConnector1">
-            <a:avLst/>
-          </a:prstGeom>
-          <a:ln w="44450">
-            <a:solidFill>
-              <a:schemeClr val="accent5">
-                <a:lumMod val="40000"/>
-                <a:lumOff val="60000"/>
-              </a:schemeClr>
-            </a:solidFill>
-            <a:tailEnd type="triangle"/>
-          </a:ln>
-        </p:spPr>
-        <p:style>
-          <a:lnRef idx="2">
-            <a:schemeClr val="accent1"/>
-          </a:lnRef>
-          <a:fillRef idx="0">
-            <a:schemeClr val="accent1"/>
-          </a:fillRef>
-          <a:effectRef idx="1">
-            <a:schemeClr val="accent1"/>
-          </a:effectRef>
-          <a:fontRef idx="minor">
-            <a:schemeClr val="tx1"/>
-          </a:fontRef>
-        </p:style>
-      </p:cxnSp>
-      <p:cxnSp>
-        <p:nvCxnSpPr>
-          <p:cNvPr id="24" name="Curved Connector 23">
-            <a:extLst>
-              <a:ext uri="{FF2B5EF4-FFF2-40B4-BE49-F238E27FC236}">
-                <a16:creationId xmlns:a16="http://schemas.microsoft.com/office/drawing/2014/main" id="{BF1E5888-5926-953A-FDE3-787745325B13}"/>
-              </a:ext>
-            </a:extLst>
-          </p:cNvPr>
-          <p:cNvCxnSpPr>
-            <a:cxnSpLocks/>
-          </p:cNvCxnSpPr>
-          <p:nvPr/>
-        </p:nvCxnSpPr>
-        <p:spPr>
-          <a:xfrm>
-            <a:off x="4985234" y="951190"/>
-            <a:ext cx="607421" cy="1766383"/>
-          </a:xfrm>
-          <a:prstGeom prst="curvedConnector3">
-            <a:avLst>
-              <a:gd name="adj1" fmla="val 160216"/>
-            </a:avLst>
-          </a:prstGeom>
-          <a:ln w="44450">
-            <a:solidFill>
-              <a:schemeClr val="accent2">
-                <a:lumMod val="60000"/>
-                <a:lumOff val="40000"/>
-              </a:schemeClr>
-            </a:solidFill>
-            <a:tailEnd type="triangle"/>
-          </a:ln>
-        </p:spPr>
-        <p:style>
-          <a:lnRef idx="2">
-            <a:schemeClr val="accent1"/>
-          </a:lnRef>
-          <a:fillRef idx="0">
-            <a:schemeClr val="accent1"/>
-          </a:fillRef>
-          <a:effectRef idx="1">
-            <a:schemeClr val="accent1"/>
-          </a:effectRef>
-          <a:fontRef idx="minor">
-            <a:schemeClr val="tx1"/>
-          </a:fontRef>
-        </p:style>
-      </p:cxnSp>
-      <p:cxnSp>
-        <p:nvCxnSpPr>
-          <p:cNvPr id="33" name="Straight Arrow Connector 32">
-            <a:extLst>
-              <a:ext uri="{FF2B5EF4-FFF2-40B4-BE49-F238E27FC236}">
-                <a16:creationId xmlns:a16="http://schemas.microsoft.com/office/drawing/2014/main" id="{E50951B6-E08B-9EBF-90FF-D86ED66F2290}"/>
-              </a:ext>
-            </a:extLst>
-          </p:cNvPr>
-          <p:cNvCxnSpPr>
-            <a:cxnSpLocks/>
-          </p:cNvCxnSpPr>
-          <p:nvPr/>
-        </p:nvCxnSpPr>
-        <p:spPr>
-          <a:xfrm flipV="1">
-            <a:off x="2670171" y="969611"/>
-            <a:ext cx="664316" cy="4810"/>
-          </a:xfrm>
-          <a:prstGeom prst="straightConnector1">
-            <a:avLst/>
-          </a:prstGeom>
-          <a:ln w="44450">
-            <a:solidFill>
-              <a:schemeClr val="accent5">
-                <a:lumMod val="40000"/>
-                <a:lumOff val="60000"/>
-              </a:schemeClr>
-            </a:solidFill>
-            <a:headEnd type="triangle"/>
-            <a:tailEnd type="triangle"/>
-          </a:ln>
-        </p:spPr>
-        <p:style>
-          <a:lnRef idx="2">
-            <a:schemeClr val="accent1"/>
-          </a:lnRef>
-          <a:fillRef idx="0">
-            <a:schemeClr val="accent1"/>
-          </a:fillRef>
-          <a:effectRef idx="1">
-            <a:schemeClr val="accent1"/>
-          </a:effectRef>
-          <a:fontRef idx="minor">
-            <a:schemeClr val="tx1"/>
-          </a:fontRef>
-        </p:style>
-      </p:cxnSp>
-      <p:cxnSp>
-        <p:nvCxnSpPr>
-          <p:cNvPr id="37" name="Straight Arrow Connector 36">
-            <a:extLst>
-              <a:ext uri="{FF2B5EF4-FFF2-40B4-BE49-F238E27FC236}">
-                <a16:creationId xmlns:a16="http://schemas.microsoft.com/office/drawing/2014/main" id="{A5CA9F1A-66D2-A88B-CBB1-7A057257BA8F}"/>
-              </a:ext>
-            </a:extLst>
-          </p:cNvPr>
-          <p:cNvCxnSpPr>
-            <a:cxnSpLocks/>
-            <a:stCxn id="6" idx="3"/>
-            <a:endCxn id="7" idx="1"/>
-          </p:cNvCxnSpPr>
-          <p:nvPr/>
-        </p:nvCxnSpPr>
-        <p:spPr>
-          <a:xfrm flipV="1">
-            <a:off x="1427911" y="2672424"/>
-            <a:ext cx="3148287" cy="5521"/>
-          </a:xfrm>
-          <a:prstGeom prst="straightConnector1">
-            <a:avLst/>
-          </a:prstGeom>
-          <a:ln w="44450">
-            <a:prstDash val="dash"/>
-            <a:headEnd type="triangle"/>
-            <a:tailEnd type="triangle"/>
-          </a:ln>
-        </p:spPr>
-        <p:style>
-          <a:lnRef idx="2">
-            <a:schemeClr val="accent1"/>
-          </a:lnRef>
-          <a:fillRef idx="0">
-            <a:schemeClr val="accent1"/>
-          </a:fillRef>
-          <a:effectRef idx="1">
-            <a:schemeClr val="accent1"/>
-          </a:effectRef>
-          <a:fontRef idx="minor">
-            <a:schemeClr val="tx1"/>
-          </a:fontRef>
-        </p:style>
-      </p:cxnSp>
-      <p:pic>
-        <p:nvPicPr>
-          <p:cNvPr id="67" name="Picture 66" descr="A silhouette of a deer&#10;&#10;Description automatically generated">
-            <a:extLst>
-              <a:ext uri="{FF2B5EF4-FFF2-40B4-BE49-F238E27FC236}">
-                <a16:creationId xmlns:a16="http://schemas.microsoft.com/office/drawing/2014/main" id="{FF9D0B46-6022-824A-70EC-931DD74FDB19}"/>
-              </a:ext>
-            </a:extLst>
-          </p:cNvPr>
-          <p:cNvPicPr>
-            <a:picLocks noChangeAspect="1"/>
-          </p:cNvPicPr>
-          <p:nvPr/>
-        </p:nvPicPr>
-        <p:blipFill>
-          <a:blip r:embed="rId4"/>
-          <a:stretch>
-            <a:fillRect/>
-          </a:stretch>
-        </p:blipFill>
-        <p:spPr>
-          <a:xfrm>
-            <a:off x="489876" y="5724395"/>
-            <a:ext cx="964902" cy="1038234"/>
-          </a:xfrm>
-          <a:prstGeom prst="rect">
-            <a:avLst/>
-          </a:prstGeom>
-        </p:spPr>
-      </p:pic>
-      <p:pic>
-        <p:nvPicPr>
-          <p:cNvPr id="68" name="Picture 67" descr="A silhouette of a deer&#10;&#10;Description automatically generated">
-            <a:extLst>
-              <a:ext uri="{FF2B5EF4-FFF2-40B4-BE49-F238E27FC236}">
-                <a16:creationId xmlns:a16="http://schemas.microsoft.com/office/drawing/2014/main" id="{398DC078-ED64-72DB-D7D5-AF215B36DA54}"/>
-              </a:ext>
-            </a:extLst>
-          </p:cNvPr>
-          <p:cNvPicPr>
-            <a:picLocks noChangeAspect="1"/>
-          </p:cNvPicPr>
-          <p:nvPr/>
-        </p:nvPicPr>
-        <p:blipFill>
-          <a:blip r:embed="rId4"/>
-          <a:stretch>
-            <a:fillRect/>
-          </a:stretch>
-        </p:blipFill>
-        <p:spPr>
-          <a:xfrm>
-            <a:off x="4603065" y="5696014"/>
-            <a:ext cx="964902" cy="1038234"/>
-          </a:xfrm>
-          <a:prstGeom prst="rect">
-            <a:avLst/>
-          </a:prstGeom>
-        </p:spPr>
-      </p:pic>
-      <p:cxnSp>
-        <p:nvCxnSpPr>
-          <p:cNvPr id="70" name="Straight Arrow Connector 69">
-            <a:extLst>
-              <a:ext uri="{FF2B5EF4-FFF2-40B4-BE49-F238E27FC236}">
-                <a16:creationId xmlns:a16="http://schemas.microsoft.com/office/drawing/2014/main" id="{B55764D3-E868-5240-963B-4AAB0FB128E7}"/>
-              </a:ext>
-            </a:extLst>
-          </p:cNvPr>
-          <p:cNvCxnSpPr>
-            <a:cxnSpLocks/>
-          </p:cNvCxnSpPr>
-          <p:nvPr/>
-        </p:nvCxnSpPr>
-        <p:spPr>
-          <a:xfrm flipH="1">
-            <a:off x="1067189" y="5251858"/>
-            <a:ext cx="380884" cy="571727"/>
-          </a:xfrm>
-          <a:prstGeom prst="straightConnector1">
-            <a:avLst/>
-          </a:prstGeom>
-          <a:ln w="44450">
-            <a:solidFill>
-              <a:schemeClr val="accent5">
-                <a:lumMod val="40000"/>
-                <a:lumOff val="60000"/>
-              </a:schemeClr>
-            </a:solidFill>
-            <a:tailEnd type="triangle"/>
-          </a:ln>
-        </p:spPr>
-        <p:style>
-          <a:lnRef idx="2">
-            <a:schemeClr val="accent1"/>
-          </a:lnRef>
-          <a:fillRef idx="0">
-            <a:schemeClr val="accent1"/>
-          </a:fillRef>
-          <a:effectRef idx="1">
-            <a:schemeClr val="accent1"/>
-          </a:effectRef>
-          <a:fontRef idx="minor">
-            <a:schemeClr val="tx1"/>
-          </a:fontRef>
-        </p:style>
-      </p:cxnSp>
-      <p:cxnSp>
-        <p:nvCxnSpPr>
-          <p:cNvPr id="71" name="Straight Arrow Connector 70">
-            <a:extLst>
-              <a:ext uri="{FF2B5EF4-FFF2-40B4-BE49-F238E27FC236}">
-                <a16:creationId xmlns:a16="http://schemas.microsoft.com/office/drawing/2014/main" id="{4E63BB7D-A7A8-8296-90DC-E88C9ABA5B4B}"/>
-              </a:ext>
-            </a:extLst>
-          </p:cNvPr>
-          <p:cNvCxnSpPr>
-            <a:cxnSpLocks/>
-          </p:cNvCxnSpPr>
-          <p:nvPr/>
-        </p:nvCxnSpPr>
-        <p:spPr>
-          <a:xfrm>
-            <a:off x="4424222" y="5226045"/>
-            <a:ext cx="444467" cy="651013"/>
-          </a:xfrm>
-          <a:prstGeom prst="straightConnector1">
-            <a:avLst/>
-          </a:prstGeom>
-          <a:ln w="44450">
-            <a:solidFill>
-              <a:schemeClr val="accent5">
-                <a:lumMod val="40000"/>
-                <a:lumOff val="60000"/>
-              </a:schemeClr>
-            </a:solidFill>
-            <a:tailEnd type="triangle"/>
-          </a:ln>
-        </p:spPr>
-        <p:style>
-          <a:lnRef idx="2">
-            <a:schemeClr val="accent1"/>
-          </a:lnRef>
-          <a:fillRef idx="0">
-            <a:schemeClr val="accent1"/>
-          </a:fillRef>
-          <a:effectRef idx="1">
-            <a:schemeClr val="accent1"/>
-          </a:effectRef>
-          <a:fontRef idx="minor">
-            <a:schemeClr val="tx1"/>
-          </a:fontRef>
-        </p:style>
-      </p:cxnSp>
-      <p:cxnSp>
-        <p:nvCxnSpPr>
-          <p:cNvPr id="73" name="Straight Arrow Connector 72">
-            <a:extLst>
-              <a:ext uri="{FF2B5EF4-FFF2-40B4-BE49-F238E27FC236}">
-                <a16:creationId xmlns:a16="http://schemas.microsoft.com/office/drawing/2014/main" id="{1FA85966-0F79-9676-4842-CF0DEF0A5443}"/>
-              </a:ext>
-            </a:extLst>
-          </p:cNvPr>
-          <p:cNvCxnSpPr>
-            <a:cxnSpLocks/>
-          </p:cNvCxnSpPr>
-          <p:nvPr/>
-        </p:nvCxnSpPr>
-        <p:spPr>
-          <a:xfrm flipV="1">
-            <a:off x="2649918" y="4754258"/>
-            <a:ext cx="664316" cy="4810"/>
-          </a:xfrm>
-          <a:prstGeom prst="straightConnector1">
-            <a:avLst/>
-          </a:prstGeom>
-          <a:ln w="44450">
-            <a:solidFill>
-              <a:schemeClr val="accent5">
-                <a:lumMod val="40000"/>
-                <a:lumOff val="60000"/>
-              </a:schemeClr>
-            </a:solidFill>
-            <a:headEnd type="triangle"/>
-            <a:tailEnd type="triangle"/>
-          </a:ln>
-        </p:spPr>
-        <p:style>
-          <a:lnRef idx="2">
-            <a:schemeClr val="accent1"/>
-          </a:lnRef>
-          <a:fillRef idx="0">
-            <a:schemeClr val="accent1"/>
-          </a:fillRef>
-          <a:effectRef idx="1">
-            <a:schemeClr val="accent1"/>
-          </a:effectRef>
-          <a:fontRef idx="minor">
-            <a:schemeClr val="tx1"/>
-          </a:fontRef>
-        </p:style>
-      </p:cxnSp>
-      <p:cxnSp>
-        <p:nvCxnSpPr>
-          <p:cNvPr id="74" name="Straight Arrow Connector 73">
-            <a:extLst>
-              <a:ext uri="{FF2B5EF4-FFF2-40B4-BE49-F238E27FC236}">
-                <a16:creationId xmlns:a16="http://schemas.microsoft.com/office/drawing/2014/main" id="{9D92527C-7FCC-CE43-331A-3484288C7666}"/>
-              </a:ext>
-            </a:extLst>
-          </p:cNvPr>
-          <p:cNvCxnSpPr>
-            <a:cxnSpLocks/>
-            <a:stCxn id="67" idx="3"/>
-            <a:endCxn id="68" idx="1"/>
-          </p:cNvCxnSpPr>
-          <p:nvPr/>
-        </p:nvCxnSpPr>
-        <p:spPr>
-          <a:xfrm flipV="1">
-            <a:off x="1454778" y="6215131"/>
-            <a:ext cx="3148287" cy="28381"/>
-          </a:xfrm>
-          <a:prstGeom prst="straightConnector1">
-            <a:avLst/>
-          </a:prstGeom>
-          <a:ln w="44450">
-            <a:prstDash val="dash"/>
-            <a:headEnd type="triangle"/>
-            <a:tailEnd type="triangle"/>
-          </a:ln>
-        </p:spPr>
-        <p:style>
-          <a:lnRef idx="2">
-            <a:schemeClr val="accent1"/>
-          </a:lnRef>
-          <a:fillRef idx="0">
-            <a:schemeClr val="accent1"/>
-          </a:fillRef>
-          <a:effectRef idx="1">
-            <a:schemeClr val="accent1"/>
-          </a:effectRef>
-          <a:fontRef idx="minor">
-            <a:schemeClr val="tx1"/>
-          </a:fontRef>
-        </p:style>
-      </p:cxnSp>
-      <p:pic>
-        <p:nvPicPr>
-          <p:cNvPr id="82" name="Picture 81" descr="A silhouette of a deer&#10;&#10;Description automatically generated">
-            <a:extLst>
-              <a:ext uri="{FF2B5EF4-FFF2-40B4-BE49-F238E27FC236}">
-                <a16:creationId xmlns:a16="http://schemas.microsoft.com/office/drawing/2014/main" id="{0B268416-CB1A-79D9-C8E7-9BD52130C804}"/>
-              </a:ext>
-            </a:extLst>
-          </p:cNvPr>
-          <p:cNvPicPr>
-            <a:picLocks noChangeAspect="1"/>
-          </p:cNvPicPr>
-          <p:nvPr/>
-        </p:nvPicPr>
-        <p:blipFill>
-          <a:blip r:embed="rId4"/>
-          <a:stretch>
-            <a:fillRect/>
-          </a:stretch>
-        </p:blipFill>
-        <p:spPr>
-          <a:xfrm>
-            <a:off x="7635516" y="5464606"/>
-            <a:ext cx="964902" cy="1038234"/>
-          </a:xfrm>
-          <a:prstGeom prst="rect">
-            <a:avLst/>
-          </a:prstGeom>
-        </p:spPr>
-      </p:pic>
-      <p:pic>
-        <p:nvPicPr>
-          <p:cNvPr id="83" name="Picture 82" descr="A black background with a black square&#10;&#10;Description automatically generated with medium confidence">
-            <a:extLst>
-              <a:ext uri="{FF2B5EF4-FFF2-40B4-BE49-F238E27FC236}">
-                <a16:creationId xmlns:a16="http://schemas.microsoft.com/office/drawing/2014/main" id="{BE313ACE-19CF-F46B-9BC2-72FEA8BEE0AB}"/>
-              </a:ext>
-            </a:extLst>
-          </p:cNvPr>
-          <p:cNvPicPr>
-            <a:picLocks noChangeAspect="1"/>
-          </p:cNvPicPr>
-          <p:nvPr/>
-        </p:nvPicPr>
-        <p:blipFill>
-          <a:blip r:embed="rId5"/>
-          <a:stretch>
-            <a:fillRect/>
-          </a:stretch>
-        </p:blipFill>
-        <p:spPr>
-          <a:xfrm>
-            <a:off x="7357321" y="3256697"/>
-            <a:ext cx="1584021" cy="1615575"/>
-          </a:xfrm>
-          <a:prstGeom prst="rect">
-            <a:avLst/>
-          </a:prstGeom>
-        </p:spPr>
-      </p:pic>
-      <p:pic>
-        <p:nvPicPr>
-          <p:cNvPr id="84" name="Picture 83" descr="A silhouette of a deer&#10;&#10;Description automatically generated">
-            <a:extLst>
-              <a:ext uri="{FF2B5EF4-FFF2-40B4-BE49-F238E27FC236}">
-                <a16:creationId xmlns:a16="http://schemas.microsoft.com/office/drawing/2014/main" id="{63103557-2706-BDBA-044B-81D9778914F0}"/>
-              </a:ext>
-            </a:extLst>
-          </p:cNvPr>
-          <p:cNvPicPr>
-            <a:picLocks noChangeAspect="1"/>
-          </p:cNvPicPr>
-          <p:nvPr/>
-        </p:nvPicPr>
-        <p:blipFill>
-          <a:blip r:embed="rId3"/>
-          <a:stretch>
-            <a:fillRect/>
-          </a:stretch>
-        </p:blipFill>
-        <p:spPr>
-          <a:xfrm>
-            <a:off x="7269765" y="1451417"/>
-            <a:ext cx="1765031" cy="1180744"/>
-          </a:xfrm>
-          <a:prstGeom prst="rect">
-            <a:avLst/>
-          </a:prstGeom>
-        </p:spPr>
-      </p:pic>
-      <p:cxnSp>
-        <p:nvCxnSpPr>
-          <p:cNvPr id="85" name="Curved Connector 84">
-            <a:extLst>
-              <a:ext uri="{FF2B5EF4-FFF2-40B4-BE49-F238E27FC236}">
-                <a16:creationId xmlns:a16="http://schemas.microsoft.com/office/drawing/2014/main" id="{0ED644B6-D85C-7DB6-EA16-8D313DC3A502}"/>
-              </a:ext>
-            </a:extLst>
-          </p:cNvPr>
-          <p:cNvCxnSpPr>
-            <a:cxnSpLocks/>
-            <a:stCxn id="84" idx="1"/>
-            <a:endCxn id="83" idx="1"/>
-          </p:cNvCxnSpPr>
-          <p:nvPr/>
-        </p:nvCxnSpPr>
-        <p:spPr>
-          <a:xfrm rot="10800000" flipH="1" flipV="1">
-            <a:off x="7269765" y="2041789"/>
-            <a:ext cx="87556" cy="2022696"/>
-          </a:xfrm>
-          <a:prstGeom prst="curvedConnector3">
-            <a:avLst>
-              <a:gd name="adj1" fmla="val -793926"/>
-            </a:avLst>
-          </a:prstGeom>
-          <a:ln w="38100">
-            <a:solidFill>
-              <a:schemeClr val="accent2">
-                <a:lumMod val="40000"/>
-                <a:lumOff val="60000"/>
-              </a:schemeClr>
-            </a:solidFill>
-            <a:tailEnd type="triangle"/>
-          </a:ln>
-        </p:spPr>
-        <p:style>
-          <a:lnRef idx="2">
-            <a:schemeClr val="accent1"/>
-          </a:lnRef>
-          <a:fillRef idx="0">
-            <a:schemeClr val="accent1"/>
-          </a:fillRef>
-          <a:effectRef idx="1">
-            <a:schemeClr val="accent1"/>
-          </a:effectRef>
-          <a:fontRef idx="minor">
-            <a:schemeClr val="tx1"/>
-          </a:fontRef>
-        </p:style>
-      </p:cxnSp>
-      <p:cxnSp>
-        <p:nvCxnSpPr>
-          <p:cNvPr id="86" name="Curved Connector 85">
-            <a:extLst>
-              <a:ext uri="{FF2B5EF4-FFF2-40B4-BE49-F238E27FC236}">
-                <a16:creationId xmlns:a16="http://schemas.microsoft.com/office/drawing/2014/main" id="{5E5F896C-5923-55EA-CCB6-E43971D6433B}"/>
-              </a:ext>
-            </a:extLst>
-          </p:cNvPr>
-          <p:cNvCxnSpPr>
-            <a:cxnSpLocks/>
-            <a:stCxn id="84" idx="3"/>
-            <a:endCxn id="83" idx="3"/>
-          </p:cNvCxnSpPr>
-          <p:nvPr/>
-        </p:nvCxnSpPr>
-        <p:spPr>
-          <a:xfrm flipH="1">
-            <a:off x="8941342" y="2041789"/>
-            <a:ext cx="93454" cy="2022696"/>
-          </a:xfrm>
-          <a:prstGeom prst="curvedConnector3">
-            <a:avLst>
-              <a:gd name="adj1" fmla="val -663948"/>
-            </a:avLst>
-          </a:prstGeom>
-          <a:ln w="38100">
-            <a:solidFill>
-              <a:schemeClr val="accent5">
-                <a:lumMod val="40000"/>
-                <a:lumOff val="60000"/>
-              </a:schemeClr>
-            </a:solidFill>
-            <a:tailEnd type="triangle"/>
-          </a:ln>
-        </p:spPr>
-        <p:style>
-          <a:lnRef idx="2">
-            <a:schemeClr val="accent1"/>
-          </a:lnRef>
-          <a:fillRef idx="0">
-            <a:schemeClr val="accent1"/>
-          </a:fillRef>
-          <a:effectRef idx="1">
-            <a:schemeClr val="accent1"/>
-          </a:effectRef>
-          <a:fontRef idx="minor">
-            <a:schemeClr val="tx1"/>
-          </a:fontRef>
-        </p:style>
-      </p:cxnSp>
-      <p:cxnSp>
-        <p:nvCxnSpPr>
-          <p:cNvPr id="87" name="Curved Connector 86">
-            <a:extLst>
-              <a:ext uri="{FF2B5EF4-FFF2-40B4-BE49-F238E27FC236}">
-                <a16:creationId xmlns:a16="http://schemas.microsoft.com/office/drawing/2014/main" id="{28145128-DD05-5259-7A5A-D2BE4BC1A1C4}"/>
-              </a:ext>
-            </a:extLst>
-          </p:cNvPr>
-          <p:cNvCxnSpPr>
-            <a:cxnSpLocks/>
-          </p:cNvCxnSpPr>
-          <p:nvPr/>
-        </p:nvCxnSpPr>
-        <p:spPr>
-          <a:xfrm flipH="1">
-            <a:off x="8702037" y="4111140"/>
-            <a:ext cx="239305" cy="1848393"/>
-          </a:xfrm>
-          <a:prstGeom prst="curvedConnector3">
-            <a:avLst>
-              <a:gd name="adj1" fmla="val -267085"/>
-            </a:avLst>
-          </a:prstGeom>
-          <a:ln w="38100">
-            <a:solidFill>
-              <a:schemeClr val="accent5">
-                <a:lumMod val="40000"/>
-                <a:lumOff val="60000"/>
-              </a:schemeClr>
-            </a:solidFill>
-            <a:tailEnd type="triangle"/>
-          </a:ln>
-        </p:spPr>
-        <p:style>
-          <a:lnRef idx="2">
-            <a:schemeClr val="accent1"/>
-          </a:lnRef>
-          <a:fillRef idx="0">
-            <a:schemeClr val="accent1"/>
-          </a:fillRef>
-          <a:effectRef idx="1">
-            <a:schemeClr val="accent1"/>
-          </a:effectRef>
-          <a:fontRef idx="minor">
-            <a:schemeClr val="tx1"/>
-          </a:fontRef>
-        </p:style>
-      </p:cxnSp>
-      <p:cxnSp>
-        <p:nvCxnSpPr>
-          <p:cNvPr id="88" name="Curved Connector 87">
-            <a:extLst>
-              <a:ext uri="{FF2B5EF4-FFF2-40B4-BE49-F238E27FC236}">
-                <a16:creationId xmlns:a16="http://schemas.microsoft.com/office/drawing/2014/main" id="{6E0E8B89-401D-EE67-444A-56AD588EEDEE}"/>
-              </a:ext>
-            </a:extLst>
-          </p:cNvPr>
-          <p:cNvCxnSpPr>
-            <a:cxnSpLocks/>
-          </p:cNvCxnSpPr>
-          <p:nvPr/>
-        </p:nvCxnSpPr>
-        <p:spPr>
-          <a:xfrm rot="5400000">
-            <a:off x="7525073" y="5208046"/>
-            <a:ext cx="907575" cy="3"/>
-          </a:xfrm>
-          <a:prstGeom prst="curvedConnector3">
-            <a:avLst>
-              <a:gd name="adj1" fmla="val 50000"/>
-            </a:avLst>
-          </a:prstGeom>
-          <a:ln w="38100">
-            <a:solidFill>
-              <a:schemeClr val="accent1"/>
-            </a:solidFill>
-            <a:prstDash val="dash"/>
-            <a:headEnd type="triangle"/>
-            <a:tailEnd type="triangle"/>
-          </a:ln>
-        </p:spPr>
-        <p:style>
-          <a:lnRef idx="2">
-            <a:schemeClr val="accent1"/>
-          </a:lnRef>
-          <a:fillRef idx="0">
-            <a:schemeClr val="accent1"/>
-          </a:fillRef>
-          <a:effectRef idx="1">
-            <a:schemeClr val="accent1"/>
-          </a:effectRef>
-          <a:fontRef idx="minor">
-            <a:schemeClr val="tx1"/>
-          </a:fontRef>
-        </p:style>
-      </p:cxnSp>
-      <p:cxnSp>
-        <p:nvCxnSpPr>
-          <p:cNvPr id="101" name="Curved Connector 100">
-            <a:extLst>
-              <a:ext uri="{FF2B5EF4-FFF2-40B4-BE49-F238E27FC236}">
-                <a16:creationId xmlns:a16="http://schemas.microsoft.com/office/drawing/2014/main" id="{FB57822F-2BB6-CA76-B304-B6E0F87C51BE}"/>
-              </a:ext>
-            </a:extLst>
-          </p:cNvPr>
-          <p:cNvCxnSpPr>
-            <a:cxnSpLocks/>
-          </p:cNvCxnSpPr>
-          <p:nvPr/>
-        </p:nvCxnSpPr>
-        <p:spPr>
-          <a:xfrm flipH="1">
-            <a:off x="7269765" y="1997545"/>
-            <a:ext cx="1765031" cy="12700"/>
-          </a:xfrm>
-          <a:prstGeom prst="curvedConnector5">
-            <a:avLst>
-              <a:gd name="adj1" fmla="val -12952"/>
-              <a:gd name="adj2" fmla="val -8024866"/>
-              <a:gd name="adj3" fmla="val 112952"/>
-            </a:avLst>
-          </a:prstGeom>
-          <a:ln w="38100">
-            <a:solidFill>
-              <a:srgbClr val="FF7A72"/>
-            </a:solidFill>
-            <a:prstDash val="dash"/>
-            <a:headEnd type="triangle"/>
-            <a:tailEnd type="triangle"/>
-          </a:ln>
-        </p:spPr>
-        <p:style>
-          <a:lnRef idx="2">
-            <a:schemeClr val="accent1"/>
-          </a:lnRef>
-          <a:fillRef idx="0">
-            <a:schemeClr val="accent1"/>
-          </a:fillRef>
-          <a:effectRef idx="1">
-            <a:schemeClr val="accent1"/>
-          </a:effectRef>
-          <a:fontRef idx="minor">
-            <a:schemeClr val="tx1"/>
-          </a:fontRef>
-        </p:style>
-      </p:cxnSp>
-      <p:sp>
-        <p:nvSpPr>
-          <p:cNvPr id="119" name="TextBox 118">
-            <a:extLst>
-              <a:ext uri="{FF2B5EF4-FFF2-40B4-BE49-F238E27FC236}">
-                <a16:creationId xmlns:a16="http://schemas.microsoft.com/office/drawing/2014/main" id="{E60D0AC9-34F4-6C5D-BEDC-A48AC3A24306}"/>
-              </a:ext>
-            </a:extLst>
-          </p:cNvPr>
-          <p:cNvSpPr txBox="1"/>
-          <p:nvPr/>
-        </p:nvSpPr>
-        <p:spPr>
-          <a:xfrm>
-            <a:off x="2115242" y="2827730"/>
-            <a:ext cx="1949636" cy="369332"/>
-          </a:xfrm>
-          <a:prstGeom prst="rect">
-            <a:avLst/>
-          </a:prstGeom>
-          <a:noFill/>
-        </p:spPr>
-        <p:txBody>
-          <a:bodyPr wrap="square" rtlCol="0">
-            <a:spAutoFit/>
-          </a:bodyPr>
-          <a:lstStyle/>
-          <a:p>
-            <a:r>
-              <a:rPr lang="en-US" dirty="0"/>
-              <a:t>0.125 V</a:t>
-            </a:r>
-            <a:r>
-              <a:rPr lang="en-US" baseline="-25000" dirty="0"/>
-              <a:t>A</a:t>
-            </a:r>
-            <a:r>
-              <a:rPr lang="en-US" dirty="0"/>
-              <a:t> + 0.5 V</a:t>
-            </a:r>
-            <a:r>
-              <a:rPr lang="en-US" baseline="-25000" dirty="0"/>
-              <a:t>MG</a:t>
-            </a:r>
-          </a:p>
-        </p:txBody>
-      </p:sp>
-      <p:sp>
-        <p:nvSpPr>
-          <p:cNvPr id="127" name="TextBox 126">
-            <a:extLst>
-              <a:ext uri="{FF2B5EF4-FFF2-40B4-BE49-F238E27FC236}">
-                <a16:creationId xmlns:a16="http://schemas.microsoft.com/office/drawing/2014/main" id="{B20B7562-7AB9-6FC3-4283-63C79F01335F}"/>
-              </a:ext>
-            </a:extLst>
-          </p:cNvPr>
-          <p:cNvSpPr txBox="1"/>
-          <p:nvPr/>
-        </p:nvSpPr>
-        <p:spPr>
-          <a:xfrm>
-            <a:off x="2426010" y="6348156"/>
-            <a:ext cx="1152088" cy="376087"/>
-          </a:xfrm>
-          <a:prstGeom prst="rect">
-            <a:avLst/>
-          </a:prstGeom>
-          <a:noFill/>
-        </p:spPr>
-        <p:txBody>
-          <a:bodyPr wrap="square" rtlCol="0">
-            <a:spAutoFit/>
-          </a:bodyPr>
-          <a:lstStyle/>
-          <a:p>
-            <a:r>
-              <a:rPr lang="en-US" dirty="0"/>
-              <a:t>0.125 V</a:t>
-            </a:r>
-            <a:r>
-              <a:rPr lang="en-US" baseline="-25000" dirty="0"/>
-              <a:t>A</a:t>
-            </a:r>
-            <a:endParaRPr lang="en-US" dirty="0"/>
-          </a:p>
-        </p:txBody>
-      </p:sp>
-      <p:sp>
-        <p:nvSpPr>
-          <p:cNvPr id="128" name="TextBox 127">
-            <a:extLst>
-              <a:ext uri="{FF2B5EF4-FFF2-40B4-BE49-F238E27FC236}">
-                <a16:creationId xmlns:a16="http://schemas.microsoft.com/office/drawing/2014/main" id="{53FC76DF-5012-3C95-7368-06EA88C7C48B}"/>
-              </a:ext>
-            </a:extLst>
-          </p:cNvPr>
-          <p:cNvSpPr txBox="1"/>
-          <p:nvPr/>
-        </p:nvSpPr>
-        <p:spPr>
-          <a:xfrm>
-            <a:off x="6291141" y="4906763"/>
-            <a:ext cx="1586100" cy="646331"/>
-          </a:xfrm>
-          <a:prstGeom prst="rect">
-            <a:avLst/>
-          </a:prstGeom>
-          <a:noFill/>
-        </p:spPr>
-        <p:txBody>
-          <a:bodyPr wrap="square" rtlCol="0">
-            <a:spAutoFit/>
-          </a:bodyPr>
-          <a:lstStyle/>
-          <a:p>
-            <a:pPr algn="r"/>
-            <a:r>
-              <a:rPr lang="en-US" dirty="0"/>
-              <a:t>0.5 V</a:t>
-            </a:r>
-            <a:r>
-              <a:rPr lang="en-US" baseline="-25000" dirty="0"/>
-              <a:t>A</a:t>
-            </a:r>
-            <a:r>
-              <a:rPr lang="en-US" dirty="0"/>
-              <a:t>  +</a:t>
-            </a:r>
-          </a:p>
-          <a:p>
-            <a:pPr algn="r"/>
-            <a:r>
-              <a:rPr lang="en-US" dirty="0"/>
-              <a:t> 0.25 COV</a:t>
-            </a:r>
-            <a:r>
-              <a:rPr lang="en-US" baseline="-25000" dirty="0"/>
-              <a:t>A,MG</a:t>
-            </a:r>
-            <a:endParaRPr lang="en-US" dirty="0"/>
-          </a:p>
-        </p:txBody>
-      </p:sp>
-      <p:sp>
-        <p:nvSpPr>
-          <p:cNvPr id="129" name="TextBox 128">
-            <a:extLst>
-              <a:ext uri="{FF2B5EF4-FFF2-40B4-BE49-F238E27FC236}">
-                <a16:creationId xmlns:a16="http://schemas.microsoft.com/office/drawing/2014/main" id="{C7F3DF30-53EE-CF30-A4F9-AA18004257F3}"/>
-              </a:ext>
-            </a:extLst>
-          </p:cNvPr>
-          <p:cNvSpPr txBox="1"/>
-          <p:nvPr/>
-        </p:nvSpPr>
-        <p:spPr>
-          <a:xfrm>
-            <a:off x="7705103" y="1871548"/>
-            <a:ext cx="1671577" cy="307777"/>
-          </a:xfrm>
-          <a:prstGeom prst="rect">
-            <a:avLst/>
-          </a:prstGeom>
-          <a:noFill/>
-        </p:spPr>
-        <p:txBody>
-          <a:bodyPr wrap="square" rtlCol="0">
-            <a:spAutoFit/>
-          </a:bodyPr>
-          <a:lstStyle/>
-          <a:p>
-            <a:r>
-              <a:rPr lang="en-US" sz="1400" dirty="0">
-                <a:solidFill>
-                  <a:schemeClr val="bg1"/>
-                </a:solidFill>
-              </a:rPr>
-              <a:t>Grandmother</a:t>
-            </a:r>
-          </a:p>
-        </p:txBody>
-      </p:sp>
-      <p:sp>
-        <p:nvSpPr>
-          <p:cNvPr id="131" name="TextBox 130">
-            <a:extLst>
-              <a:ext uri="{FF2B5EF4-FFF2-40B4-BE49-F238E27FC236}">
-                <a16:creationId xmlns:a16="http://schemas.microsoft.com/office/drawing/2014/main" id="{6FE1A45F-4E9A-9752-67A6-48E217531790}"/>
-              </a:ext>
-            </a:extLst>
-          </p:cNvPr>
-          <p:cNvSpPr txBox="1"/>
-          <p:nvPr/>
-        </p:nvSpPr>
-        <p:spPr>
-          <a:xfrm>
-            <a:off x="3952178" y="808590"/>
-            <a:ext cx="781839" cy="307777"/>
-          </a:xfrm>
-          <a:prstGeom prst="rect">
-            <a:avLst/>
-          </a:prstGeom>
-          <a:noFill/>
-        </p:spPr>
-        <p:txBody>
-          <a:bodyPr wrap="square" rtlCol="0">
-            <a:spAutoFit/>
-          </a:bodyPr>
-          <a:lstStyle/>
-          <a:p>
-            <a:r>
-              <a:rPr lang="en-US" sz="1400" dirty="0">
-                <a:solidFill>
-                  <a:schemeClr val="bg1"/>
-                </a:solidFill>
-              </a:rPr>
-              <a:t>Aunt</a:t>
-            </a:r>
-          </a:p>
-        </p:txBody>
-      </p:sp>
-      <p:sp>
-        <p:nvSpPr>
-          <p:cNvPr id="132" name="TextBox 131">
-            <a:extLst>
-              <a:ext uri="{FF2B5EF4-FFF2-40B4-BE49-F238E27FC236}">
-                <a16:creationId xmlns:a16="http://schemas.microsoft.com/office/drawing/2014/main" id="{33A80D85-1907-9558-53AA-83A6BB81CBA0}"/>
-              </a:ext>
-            </a:extLst>
-          </p:cNvPr>
-          <p:cNvSpPr txBox="1"/>
-          <p:nvPr/>
-        </p:nvSpPr>
-        <p:spPr>
-          <a:xfrm>
-            <a:off x="4664275" y="2450248"/>
-            <a:ext cx="811835" cy="307777"/>
-          </a:xfrm>
-          <a:prstGeom prst="rect">
-            <a:avLst/>
-          </a:prstGeom>
-          <a:noFill/>
-        </p:spPr>
-        <p:txBody>
-          <a:bodyPr wrap="square" rtlCol="0">
-            <a:spAutoFit/>
-          </a:bodyPr>
-          <a:lstStyle/>
-          <a:p>
-            <a:r>
-              <a:rPr lang="en-US" sz="1400" dirty="0">
-                <a:solidFill>
-                  <a:schemeClr val="bg1"/>
-                </a:solidFill>
-              </a:rPr>
-              <a:t>Cousin</a:t>
-            </a:r>
-          </a:p>
-        </p:txBody>
-      </p:sp>
-      <p:sp>
-        <p:nvSpPr>
-          <p:cNvPr id="133" name="TextBox 132">
-            <a:extLst>
-              <a:ext uri="{FF2B5EF4-FFF2-40B4-BE49-F238E27FC236}">
-                <a16:creationId xmlns:a16="http://schemas.microsoft.com/office/drawing/2014/main" id="{D91EE373-E3BC-9CDE-45B6-2D1FD5313728}"/>
-              </a:ext>
-            </a:extLst>
-          </p:cNvPr>
-          <p:cNvSpPr txBox="1"/>
-          <p:nvPr/>
-        </p:nvSpPr>
-        <p:spPr>
-          <a:xfrm>
-            <a:off x="1567462" y="789776"/>
-            <a:ext cx="754928" cy="307777"/>
-          </a:xfrm>
-          <a:prstGeom prst="rect">
-            <a:avLst/>
-          </a:prstGeom>
-          <a:noFill/>
-        </p:spPr>
-        <p:txBody>
-          <a:bodyPr wrap="square" rtlCol="0">
-            <a:spAutoFit/>
-          </a:bodyPr>
-          <a:lstStyle/>
-          <a:p>
-            <a:r>
-              <a:rPr lang="en-US" sz="1400" dirty="0">
-                <a:solidFill>
-                  <a:schemeClr val="bg1"/>
-                </a:solidFill>
-              </a:rPr>
-              <a:t>Mother</a:t>
-            </a:r>
-          </a:p>
-        </p:txBody>
-      </p:sp>
-      <p:sp>
-        <p:nvSpPr>
-          <p:cNvPr id="134" name="TextBox 133">
-            <a:extLst>
-              <a:ext uri="{FF2B5EF4-FFF2-40B4-BE49-F238E27FC236}">
-                <a16:creationId xmlns:a16="http://schemas.microsoft.com/office/drawing/2014/main" id="{5C1BD17A-FFD7-E889-250B-1A533F4938AD}"/>
-              </a:ext>
-            </a:extLst>
-          </p:cNvPr>
-          <p:cNvSpPr txBox="1"/>
-          <p:nvPr/>
-        </p:nvSpPr>
-        <p:spPr>
-          <a:xfrm>
-            <a:off x="4691142" y="5988699"/>
-            <a:ext cx="811835" cy="307777"/>
-          </a:xfrm>
-          <a:prstGeom prst="rect">
-            <a:avLst/>
-          </a:prstGeom>
-          <a:noFill/>
-        </p:spPr>
-        <p:txBody>
-          <a:bodyPr wrap="square" rtlCol="0">
-            <a:spAutoFit/>
-          </a:bodyPr>
-          <a:lstStyle/>
-          <a:p>
-            <a:r>
-              <a:rPr lang="en-US" sz="1400" dirty="0">
-                <a:solidFill>
-                  <a:schemeClr val="bg1"/>
-                </a:solidFill>
-              </a:rPr>
-              <a:t>Cousin</a:t>
-            </a:r>
-          </a:p>
-        </p:txBody>
-      </p:sp>
-      <p:sp>
-        <p:nvSpPr>
-          <p:cNvPr id="135" name="TextBox 134">
-            <a:extLst>
-              <a:ext uri="{FF2B5EF4-FFF2-40B4-BE49-F238E27FC236}">
-                <a16:creationId xmlns:a16="http://schemas.microsoft.com/office/drawing/2014/main" id="{0CC5F275-AAA6-8946-F579-CD1B930429AC}"/>
-              </a:ext>
-            </a:extLst>
-          </p:cNvPr>
-          <p:cNvSpPr txBox="1"/>
-          <p:nvPr/>
-        </p:nvSpPr>
-        <p:spPr>
-          <a:xfrm>
-            <a:off x="3737518" y="4499923"/>
-            <a:ext cx="781839" cy="307777"/>
-          </a:xfrm>
-          <a:prstGeom prst="rect">
-            <a:avLst/>
-          </a:prstGeom>
-          <a:noFill/>
-        </p:spPr>
-        <p:txBody>
-          <a:bodyPr wrap="square" rtlCol="0">
-            <a:spAutoFit/>
-          </a:bodyPr>
-          <a:lstStyle/>
-          <a:p>
-            <a:r>
-              <a:rPr lang="en-US" sz="1400" dirty="0">
-                <a:solidFill>
-                  <a:schemeClr val="bg1"/>
-                </a:solidFill>
-              </a:rPr>
-              <a:t>Uncle</a:t>
-            </a:r>
-          </a:p>
-        </p:txBody>
-      </p:sp>
-      <p:sp>
-        <p:nvSpPr>
-          <p:cNvPr id="136" name="TextBox 135">
-            <a:extLst>
-              <a:ext uri="{FF2B5EF4-FFF2-40B4-BE49-F238E27FC236}">
-                <a16:creationId xmlns:a16="http://schemas.microsoft.com/office/drawing/2014/main" id="{7F69EED2-0D5B-E689-9FB6-8CFC7AC52174}"/>
-              </a:ext>
-            </a:extLst>
-          </p:cNvPr>
-          <p:cNvSpPr txBox="1"/>
-          <p:nvPr/>
-        </p:nvSpPr>
-        <p:spPr>
-          <a:xfrm>
-            <a:off x="1497720" y="4482941"/>
-            <a:ext cx="754928" cy="307777"/>
-          </a:xfrm>
-          <a:prstGeom prst="rect">
-            <a:avLst/>
-          </a:prstGeom>
-          <a:noFill/>
-        </p:spPr>
-        <p:txBody>
-          <a:bodyPr wrap="square" rtlCol="0">
-            <a:spAutoFit/>
-          </a:bodyPr>
-          <a:lstStyle/>
-          <a:p>
-            <a:r>
-              <a:rPr lang="en-US" sz="1400" dirty="0">
-                <a:solidFill>
-                  <a:schemeClr val="bg1"/>
-                </a:solidFill>
-              </a:rPr>
-              <a:t>Father</a:t>
-            </a:r>
-          </a:p>
-        </p:txBody>
-      </p:sp>
-      <p:sp>
-        <p:nvSpPr>
-          <p:cNvPr id="158" name="TextBox 157">
-            <a:extLst>
-              <a:ext uri="{FF2B5EF4-FFF2-40B4-BE49-F238E27FC236}">
-                <a16:creationId xmlns:a16="http://schemas.microsoft.com/office/drawing/2014/main" id="{8EF446A4-9529-247F-AD56-178515B0B005}"/>
-              </a:ext>
-            </a:extLst>
-          </p:cNvPr>
-          <p:cNvSpPr txBox="1"/>
-          <p:nvPr/>
-        </p:nvSpPr>
-        <p:spPr>
-          <a:xfrm>
-            <a:off x="7734052" y="4042549"/>
-            <a:ext cx="754928" cy="307777"/>
-          </a:xfrm>
-          <a:prstGeom prst="rect">
-            <a:avLst/>
-          </a:prstGeom>
-          <a:noFill/>
-        </p:spPr>
-        <p:txBody>
-          <a:bodyPr wrap="square" rtlCol="0">
-            <a:spAutoFit/>
-          </a:bodyPr>
-          <a:lstStyle/>
-          <a:p>
-            <a:r>
-              <a:rPr lang="en-US" sz="1400" dirty="0">
-                <a:solidFill>
-                  <a:schemeClr val="bg1"/>
-                </a:solidFill>
-              </a:rPr>
-              <a:t>Father</a:t>
-            </a:r>
-          </a:p>
-        </p:txBody>
-      </p:sp>
-      <p:sp>
-        <p:nvSpPr>
-          <p:cNvPr id="159" name="TextBox 158">
-            <a:extLst>
-              <a:ext uri="{FF2B5EF4-FFF2-40B4-BE49-F238E27FC236}">
-                <a16:creationId xmlns:a16="http://schemas.microsoft.com/office/drawing/2014/main" id="{6485E05D-B4A3-3FE7-148F-26D3F03457FE}"/>
-              </a:ext>
-            </a:extLst>
-          </p:cNvPr>
-          <p:cNvSpPr txBox="1"/>
-          <p:nvPr/>
-        </p:nvSpPr>
-        <p:spPr>
+        </p:nvGrpSpPr>
+        <p:grpSpPr>
           <a:xfrm>
             <a:off x="460056" y="307910"/>
-            <a:ext cx="475769" cy="369332"/>
+            <a:ext cx="8916624" cy="6454719"/>
+            <a:chOff x="460056" y="307910"/>
+            <a:chExt cx="8916624" cy="6454719"/>
           </a:xfrm>
-          <a:prstGeom prst="rect">
-            <a:avLst/>
-          </a:prstGeom>
-          <a:noFill/>
-        </p:spPr>
-        <p:txBody>
-          <a:bodyPr wrap="square" rtlCol="0">
-            <a:spAutoFit/>
-          </a:bodyPr>
-          <a:lstStyle/>
-          <a:p>
-            <a:r>
-              <a:rPr lang="en-US" dirty="0"/>
-              <a:t>A)</a:t>
-            </a:r>
-          </a:p>
-        </p:txBody>
-      </p:sp>
-      <p:sp>
-        <p:nvSpPr>
-          <p:cNvPr id="160" name="TextBox 159">
-            <a:extLst>
-              <a:ext uri="{FF2B5EF4-FFF2-40B4-BE49-F238E27FC236}">
-                <a16:creationId xmlns:a16="http://schemas.microsoft.com/office/drawing/2014/main" id="{B67EABD7-68A2-6D58-91E9-5F8138945DBC}"/>
-              </a:ext>
-            </a:extLst>
-          </p:cNvPr>
-          <p:cNvSpPr txBox="1"/>
-          <p:nvPr/>
-        </p:nvSpPr>
-        <p:spPr>
-          <a:xfrm>
-            <a:off x="601589" y="4164492"/>
-            <a:ext cx="475769" cy="369332"/>
-          </a:xfrm>
-          <a:prstGeom prst="rect">
-            <a:avLst/>
-          </a:prstGeom>
-          <a:noFill/>
-        </p:spPr>
-        <p:txBody>
-          <a:bodyPr wrap="square" rtlCol="0">
-            <a:spAutoFit/>
-          </a:bodyPr>
-          <a:lstStyle/>
-          <a:p>
-            <a:r>
-              <a:rPr lang="en-US" dirty="0"/>
-              <a:t>B)</a:t>
-            </a:r>
-          </a:p>
-        </p:txBody>
-      </p:sp>
-      <p:sp>
-        <p:nvSpPr>
-          <p:cNvPr id="161" name="TextBox 160">
-            <a:extLst>
-              <a:ext uri="{FF2B5EF4-FFF2-40B4-BE49-F238E27FC236}">
-                <a16:creationId xmlns:a16="http://schemas.microsoft.com/office/drawing/2014/main" id="{1417974F-0E07-0AC6-7DAE-A9C42EBA5B5F}"/>
-              </a:ext>
-            </a:extLst>
-          </p:cNvPr>
-          <p:cNvSpPr txBox="1"/>
-          <p:nvPr/>
-        </p:nvSpPr>
-        <p:spPr>
-          <a:xfrm>
-            <a:off x="6371480" y="969611"/>
-            <a:ext cx="475769" cy="369332"/>
-          </a:xfrm>
-          <a:prstGeom prst="rect">
-            <a:avLst/>
-          </a:prstGeom>
-          <a:noFill/>
-        </p:spPr>
-        <p:txBody>
-          <a:bodyPr wrap="square" rtlCol="0">
-            <a:spAutoFit/>
-          </a:bodyPr>
-          <a:lstStyle/>
-          <a:p>
-            <a:r>
-              <a:rPr lang="en-US" dirty="0"/>
-              <a:t>C)</a:t>
-            </a:r>
-          </a:p>
-        </p:txBody>
-      </p:sp>
-      <p:sp>
-        <p:nvSpPr>
-          <p:cNvPr id="181" name="TextBox 180">
-            <a:extLst>
-              <a:ext uri="{FF2B5EF4-FFF2-40B4-BE49-F238E27FC236}">
-                <a16:creationId xmlns:a16="http://schemas.microsoft.com/office/drawing/2014/main" id="{A2FFAE7D-69EA-D883-82EE-C3A4285A1D3D}"/>
-              </a:ext>
-            </a:extLst>
-          </p:cNvPr>
-          <p:cNvSpPr txBox="1"/>
-          <p:nvPr/>
-        </p:nvSpPr>
-        <p:spPr>
-          <a:xfrm>
-            <a:off x="625948" y="6036138"/>
-            <a:ext cx="811835" cy="307777"/>
-          </a:xfrm>
-          <a:prstGeom prst="rect">
-            <a:avLst/>
-          </a:prstGeom>
-          <a:noFill/>
-        </p:spPr>
-        <p:txBody>
-          <a:bodyPr wrap="square" rtlCol="0">
-            <a:spAutoFit/>
-          </a:bodyPr>
-          <a:lstStyle/>
-          <a:p>
-            <a:r>
-              <a:rPr lang="en-US" sz="1400" dirty="0">
-                <a:solidFill>
-                  <a:schemeClr val="bg1"/>
-                </a:solidFill>
-              </a:rPr>
-              <a:t>Focal</a:t>
-            </a:r>
-          </a:p>
-        </p:txBody>
-      </p:sp>
-      <p:sp>
-        <p:nvSpPr>
-          <p:cNvPr id="182" name="TextBox 181">
-            <a:extLst>
-              <a:ext uri="{FF2B5EF4-FFF2-40B4-BE49-F238E27FC236}">
-                <a16:creationId xmlns:a16="http://schemas.microsoft.com/office/drawing/2014/main" id="{2E716739-F62E-E479-FDE5-C4008864AA2B}"/>
-              </a:ext>
-            </a:extLst>
-          </p:cNvPr>
-          <p:cNvSpPr txBox="1"/>
-          <p:nvPr/>
-        </p:nvSpPr>
-        <p:spPr>
-          <a:xfrm>
-            <a:off x="588078" y="2485217"/>
-            <a:ext cx="811835" cy="307777"/>
-          </a:xfrm>
-          <a:prstGeom prst="rect">
-            <a:avLst/>
-          </a:prstGeom>
-          <a:noFill/>
-        </p:spPr>
-        <p:txBody>
-          <a:bodyPr wrap="square" rtlCol="0">
-            <a:spAutoFit/>
-          </a:bodyPr>
-          <a:lstStyle/>
-          <a:p>
-            <a:r>
-              <a:rPr lang="en-US" sz="1400" dirty="0">
-                <a:solidFill>
-                  <a:schemeClr val="bg1"/>
-                </a:solidFill>
-              </a:rPr>
-              <a:t>Focal</a:t>
-            </a:r>
-          </a:p>
-        </p:txBody>
-      </p:sp>
-      <p:sp>
-        <p:nvSpPr>
-          <p:cNvPr id="183" name="TextBox 182">
-            <a:extLst>
-              <a:ext uri="{FF2B5EF4-FFF2-40B4-BE49-F238E27FC236}">
-                <a16:creationId xmlns:a16="http://schemas.microsoft.com/office/drawing/2014/main" id="{DA2633FB-D73D-B874-25F2-238096738C7A}"/>
-              </a:ext>
-            </a:extLst>
-          </p:cNvPr>
-          <p:cNvSpPr txBox="1"/>
-          <p:nvPr/>
-        </p:nvSpPr>
-        <p:spPr>
-          <a:xfrm>
-            <a:off x="7783673" y="5774560"/>
-            <a:ext cx="811835" cy="307777"/>
-          </a:xfrm>
-          <a:prstGeom prst="rect">
-            <a:avLst/>
-          </a:prstGeom>
-          <a:noFill/>
-        </p:spPr>
-        <p:txBody>
-          <a:bodyPr wrap="square" rtlCol="0">
-            <a:spAutoFit/>
-          </a:bodyPr>
-          <a:lstStyle/>
-          <a:p>
-            <a:r>
-              <a:rPr lang="en-US" sz="1400" dirty="0">
-                <a:solidFill>
-                  <a:schemeClr val="bg1"/>
-                </a:solidFill>
-              </a:rPr>
-              <a:t>Focal</a:t>
-            </a:r>
-          </a:p>
-        </p:txBody>
-      </p:sp>
+        </p:grpSpPr>
+        <p:pic>
+          <p:nvPicPr>
+            <p:cNvPr id="4" name="Picture 3" descr="A silhouette of a deer&#10;&#10;Description automatically generated">
+              <a:extLst>
+                <a:ext uri="{FF2B5EF4-FFF2-40B4-BE49-F238E27FC236}">
+                  <a16:creationId xmlns:a16="http://schemas.microsoft.com/office/drawing/2014/main" id="{BFD4D87D-5FCC-F075-FFE2-E2993389FE24}"/>
+                </a:ext>
+              </a:extLst>
+            </p:cNvPr>
+            <p:cNvPicPr>
+              <a:picLocks noChangeAspect="1"/>
+            </p:cNvPicPr>
+            <p:nvPr/>
+          </p:nvPicPr>
+          <p:blipFill>
+            <a:blip r:embed="rId3"/>
+            <a:stretch>
+              <a:fillRect/>
+            </a:stretch>
+          </p:blipFill>
+          <p:spPr>
+            <a:xfrm>
+              <a:off x="1042719" y="427241"/>
+              <a:ext cx="1580827" cy="1057519"/>
+            </a:xfrm>
+            <a:prstGeom prst="rect">
+              <a:avLst/>
+            </a:prstGeom>
+          </p:spPr>
+        </p:pic>
+        <p:pic>
+          <p:nvPicPr>
+            <p:cNvPr id="5" name="Picture 4" descr="A silhouette of a deer&#10;&#10;Description automatically generated">
+              <a:extLst>
+                <a:ext uri="{FF2B5EF4-FFF2-40B4-BE49-F238E27FC236}">
+                  <a16:creationId xmlns:a16="http://schemas.microsoft.com/office/drawing/2014/main" id="{5DC55B3D-B4AD-B971-7238-C3E6C3F8ADE3}"/>
+                </a:ext>
+              </a:extLst>
+            </p:cNvPr>
+            <p:cNvPicPr>
+              <a:picLocks noChangeAspect="1"/>
+            </p:cNvPicPr>
+            <p:nvPr/>
+          </p:nvPicPr>
+          <p:blipFill>
+            <a:blip r:embed="rId3"/>
+            <a:stretch>
+              <a:fillRect/>
+            </a:stretch>
+          </p:blipFill>
+          <p:spPr>
+            <a:xfrm>
+              <a:off x="3287862" y="422431"/>
+              <a:ext cx="1580827" cy="1057519"/>
+            </a:xfrm>
+            <a:prstGeom prst="rect">
+              <a:avLst/>
+            </a:prstGeom>
+          </p:spPr>
+        </p:pic>
+        <p:pic>
+          <p:nvPicPr>
+            <p:cNvPr id="6" name="Picture 5" descr="A silhouette of a deer&#10;&#10;Description automatically generated">
+              <a:extLst>
+                <a:ext uri="{FF2B5EF4-FFF2-40B4-BE49-F238E27FC236}">
+                  <a16:creationId xmlns:a16="http://schemas.microsoft.com/office/drawing/2014/main" id="{8C2AE8C2-7A76-7525-A8DD-CF35913DB3EA}"/>
+                </a:ext>
+              </a:extLst>
+            </p:cNvPr>
+            <p:cNvPicPr>
+              <a:picLocks noChangeAspect="1"/>
+            </p:cNvPicPr>
+            <p:nvPr/>
+          </p:nvPicPr>
+          <p:blipFill>
+            <a:blip r:embed="rId4"/>
+            <a:stretch>
+              <a:fillRect/>
+            </a:stretch>
+          </p:blipFill>
+          <p:spPr>
+            <a:xfrm>
+              <a:off x="463009" y="2158828"/>
+              <a:ext cx="964902" cy="1038234"/>
+            </a:xfrm>
+            <a:prstGeom prst="rect">
+              <a:avLst/>
+            </a:prstGeom>
+          </p:spPr>
+        </p:pic>
+        <p:pic>
+          <p:nvPicPr>
+            <p:cNvPr id="7" name="Picture 6" descr="A silhouette of a deer&#10;&#10;Description automatically generated">
+              <a:extLst>
+                <a:ext uri="{FF2B5EF4-FFF2-40B4-BE49-F238E27FC236}">
+                  <a16:creationId xmlns:a16="http://schemas.microsoft.com/office/drawing/2014/main" id="{9EDA73FC-1662-C5DF-7C05-B6E4ACE9AD39}"/>
+                </a:ext>
+              </a:extLst>
+            </p:cNvPr>
+            <p:cNvPicPr>
+              <a:picLocks noChangeAspect="1"/>
+            </p:cNvPicPr>
+            <p:nvPr/>
+          </p:nvPicPr>
+          <p:blipFill>
+            <a:blip r:embed="rId4"/>
+            <a:stretch>
+              <a:fillRect/>
+            </a:stretch>
+          </p:blipFill>
+          <p:spPr>
+            <a:xfrm>
+              <a:off x="4576198" y="2153307"/>
+              <a:ext cx="964902" cy="1038234"/>
+            </a:xfrm>
+            <a:prstGeom prst="rect">
+              <a:avLst/>
+            </a:prstGeom>
+          </p:spPr>
+        </p:pic>
+        <p:pic>
+          <p:nvPicPr>
+            <p:cNvPr id="8" name="Picture 7" descr="A black background with a black square&#10;&#10;Description automatically generated with medium confidence">
+              <a:extLst>
+                <a:ext uri="{FF2B5EF4-FFF2-40B4-BE49-F238E27FC236}">
+                  <a16:creationId xmlns:a16="http://schemas.microsoft.com/office/drawing/2014/main" id="{DE0BD878-AF74-DC2F-5984-AE5275F2E2F7}"/>
+                </a:ext>
+              </a:extLst>
+            </p:cNvPr>
+            <p:cNvPicPr>
+              <a:picLocks noChangeAspect="1"/>
+            </p:cNvPicPr>
+            <p:nvPr/>
+          </p:nvPicPr>
+          <p:blipFill>
+            <a:blip r:embed="rId5"/>
+            <a:stretch>
+              <a:fillRect/>
+            </a:stretch>
+          </p:blipFill>
+          <p:spPr>
+            <a:xfrm>
+              <a:off x="1273700" y="3804784"/>
+              <a:ext cx="1371951" cy="1399281"/>
+            </a:xfrm>
+            <a:prstGeom prst="rect">
+              <a:avLst/>
+            </a:prstGeom>
+          </p:spPr>
+        </p:pic>
+        <p:pic>
+          <p:nvPicPr>
+            <p:cNvPr id="9" name="Picture 8" descr="A black background with a black square&#10;&#10;Description automatically generated with medium confidence">
+              <a:extLst>
+                <a:ext uri="{FF2B5EF4-FFF2-40B4-BE49-F238E27FC236}">
+                  <a16:creationId xmlns:a16="http://schemas.microsoft.com/office/drawing/2014/main" id="{2693E495-9CC5-E868-5560-0D1CC6B08B29}"/>
+                </a:ext>
+              </a:extLst>
+            </p:cNvPr>
+            <p:cNvPicPr>
+              <a:picLocks noChangeAspect="1"/>
+            </p:cNvPicPr>
+            <p:nvPr/>
+          </p:nvPicPr>
+          <p:blipFill>
+            <a:blip r:embed="rId5"/>
+            <a:stretch>
+              <a:fillRect/>
+            </a:stretch>
+          </p:blipFill>
+          <p:spPr>
+            <a:xfrm>
+              <a:off x="3455400" y="3834184"/>
+              <a:ext cx="1371951" cy="1399281"/>
+            </a:xfrm>
+            <a:prstGeom prst="rect">
+              <a:avLst/>
+            </a:prstGeom>
+          </p:spPr>
+        </p:pic>
+        <p:cxnSp>
+          <p:nvCxnSpPr>
+            <p:cNvPr id="13" name="Curved Connector 12">
+              <a:extLst>
+                <a:ext uri="{FF2B5EF4-FFF2-40B4-BE49-F238E27FC236}">
+                  <a16:creationId xmlns:a16="http://schemas.microsoft.com/office/drawing/2014/main" id="{21E1DD74-15EC-4044-4F1D-B1CF9BA9D438}"/>
+                </a:ext>
+              </a:extLst>
+            </p:cNvPr>
+            <p:cNvCxnSpPr>
+              <a:cxnSpLocks/>
+            </p:cNvCxnSpPr>
+            <p:nvPr/>
+          </p:nvCxnSpPr>
+          <p:spPr>
+            <a:xfrm rot="10800000" flipV="1">
+              <a:off x="460057" y="931004"/>
+              <a:ext cx="533991" cy="1708102"/>
+            </a:xfrm>
+            <a:prstGeom prst="curvedConnector3">
+              <a:avLst>
+                <a:gd name="adj1" fmla="val 165525"/>
+              </a:avLst>
+            </a:prstGeom>
+            <a:ln w="44450">
+              <a:solidFill>
+                <a:schemeClr val="accent2">
+                  <a:lumMod val="60000"/>
+                  <a:lumOff val="40000"/>
+                </a:schemeClr>
+              </a:solidFill>
+              <a:tailEnd type="triangle"/>
+            </a:ln>
+          </p:spPr>
+          <p:style>
+            <a:lnRef idx="2">
+              <a:schemeClr val="accent1"/>
+            </a:lnRef>
+            <a:fillRef idx="0">
+              <a:schemeClr val="accent1"/>
+            </a:fillRef>
+            <a:effectRef idx="1">
+              <a:schemeClr val="accent1"/>
+            </a:effectRef>
+            <a:fontRef idx="minor">
+              <a:schemeClr val="tx1"/>
+            </a:fontRef>
+          </p:style>
+        </p:cxnSp>
+        <p:cxnSp>
+          <p:nvCxnSpPr>
+            <p:cNvPr id="18" name="Straight Arrow Connector 17">
+              <a:extLst>
+                <a:ext uri="{FF2B5EF4-FFF2-40B4-BE49-F238E27FC236}">
+                  <a16:creationId xmlns:a16="http://schemas.microsoft.com/office/drawing/2014/main" id="{7297CC85-20F1-2A11-CA8E-7E4EE5C3DAC6}"/>
+                </a:ext>
+              </a:extLst>
+            </p:cNvPr>
+            <p:cNvCxnSpPr>
+              <a:cxnSpLocks/>
+              <a:endCxn id="6" idx="0"/>
+            </p:cNvCxnSpPr>
+            <p:nvPr/>
+          </p:nvCxnSpPr>
+          <p:spPr>
+            <a:xfrm flipH="1">
+              <a:off x="945460" y="1387821"/>
+              <a:ext cx="488286" cy="771007"/>
+            </a:xfrm>
+            <a:prstGeom prst="straightConnector1">
+              <a:avLst/>
+            </a:prstGeom>
+            <a:ln w="44450">
+              <a:solidFill>
+                <a:schemeClr val="accent5">
+                  <a:lumMod val="40000"/>
+                  <a:lumOff val="60000"/>
+                </a:schemeClr>
+              </a:solidFill>
+              <a:tailEnd type="triangle"/>
+            </a:ln>
+          </p:spPr>
+          <p:style>
+            <a:lnRef idx="2">
+              <a:schemeClr val="accent1"/>
+            </a:lnRef>
+            <a:fillRef idx="0">
+              <a:schemeClr val="accent1"/>
+            </a:fillRef>
+            <a:effectRef idx="1">
+              <a:schemeClr val="accent1"/>
+            </a:effectRef>
+            <a:fontRef idx="minor">
+              <a:schemeClr val="tx1"/>
+            </a:fontRef>
+          </p:style>
+        </p:cxnSp>
+        <p:cxnSp>
+          <p:nvCxnSpPr>
+            <p:cNvPr id="19" name="Straight Arrow Connector 18">
+              <a:extLst>
+                <a:ext uri="{FF2B5EF4-FFF2-40B4-BE49-F238E27FC236}">
+                  <a16:creationId xmlns:a16="http://schemas.microsoft.com/office/drawing/2014/main" id="{8C19E5D1-4BD2-D597-1AED-8DCF593E09B9}"/>
+                </a:ext>
+              </a:extLst>
+            </p:cNvPr>
+            <p:cNvCxnSpPr>
+              <a:cxnSpLocks/>
+            </p:cNvCxnSpPr>
+            <p:nvPr/>
+          </p:nvCxnSpPr>
+          <p:spPr>
+            <a:xfrm>
+              <a:off x="4367575" y="1479950"/>
+              <a:ext cx="501114" cy="800782"/>
+            </a:xfrm>
+            <a:prstGeom prst="straightConnector1">
+              <a:avLst/>
+            </a:prstGeom>
+            <a:ln w="44450">
+              <a:solidFill>
+                <a:schemeClr val="accent5">
+                  <a:lumMod val="40000"/>
+                  <a:lumOff val="60000"/>
+                </a:schemeClr>
+              </a:solidFill>
+              <a:tailEnd type="triangle"/>
+            </a:ln>
+          </p:spPr>
+          <p:style>
+            <a:lnRef idx="2">
+              <a:schemeClr val="accent1"/>
+            </a:lnRef>
+            <a:fillRef idx="0">
+              <a:schemeClr val="accent1"/>
+            </a:fillRef>
+            <a:effectRef idx="1">
+              <a:schemeClr val="accent1"/>
+            </a:effectRef>
+            <a:fontRef idx="minor">
+              <a:schemeClr val="tx1"/>
+            </a:fontRef>
+          </p:style>
+        </p:cxnSp>
+        <p:cxnSp>
+          <p:nvCxnSpPr>
+            <p:cNvPr id="24" name="Curved Connector 23">
+              <a:extLst>
+                <a:ext uri="{FF2B5EF4-FFF2-40B4-BE49-F238E27FC236}">
+                  <a16:creationId xmlns:a16="http://schemas.microsoft.com/office/drawing/2014/main" id="{BF1E5888-5926-953A-FDE3-787745325B13}"/>
+                </a:ext>
+              </a:extLst>
+            </p:cNvPr>
+            <p:cNvCxnSpPr>
+              <a:cxnSpLocks/>
+            </p:cNvCxnSpPr>
+            <p:nvPr/>
+          </p:nvCxnSpPr>
+          <p:spPr>
+            <a:xfrm>
+              <a:off x="4985234" y="951190"/>
+              <a:ext cx="607421" cy="1766383"/>
+            </a:xfrm>
+            <a:prstGeom prst="curvedConnector3">
+              <a:avLst>
+                <a:gd name="adj1" fmla="val 160216"/>
+              </a:avLst>
+            </a:prstGeom>
+            <a:ln w="44450">
+              <a:solidFill>
+                <a:schemeClr val="accent2">
+                  <a:lumMod val="60000"/>
+                  <a:lumOff val="40000"/>
+                </a:schemeClr>
+              </a:solidFill>
+              <a:tailEnd type="triangle"/>
+            </a:ln>
+          </p:spPr>
+          <p:style>
+            <a:lnRef idx="2">
+              <a:schemeClr val="accent1"/>
+            </a:lnRef>
+            <a:fillRef idx="0">
+              <a:schemeClr val="accent1"/>
+            </a:fillRef>
+            <a:effectRef idx="1">
+              <a:schemeClr val="accent1"/>
+            </a:effectRef>
+            <a:fontRef idx="minor">
+              <a:schemeClr val="tx1"/>
+            </a:fontRef>
+          </p:style>
+        </p:cxnSp>
+        <p:cxnSp>
+          <p:nvCxnSpPr>
+            <p:cNvPr id="33" name="Straight Arrow Connector 32">
+              <a:extLst>
+                <a:ext uri="{FF2B5EF4-FFF2-40B4-BE49-F238E27FC236}">
+                  <a16:creationId xmlns:a16="http://schemas.microsoft.com/office/drawing/2014/main" id="{E50951B6-E08B-9EBF-90FF-D86ED66F2290}"/>
+                </a:ext>
+              </a:extLst>
+            </p:cNvPr>
+            <p:cNvCxnSpPr>
+              <a:cxnSpLocks/>
+            </p:cNvCxnSpPr>
+            <p:nvPr/>
+          </p:nvCxnSpPr>
+          <p:spPr>
+            <a:xfrm flipV="1">
+              <a:off x="2670171" y="969611"/>
+              <a:ext cx="664316" cy="4810"/>
+            </a:xfrm>
+            <a:prstGeom prst="straightConnector1">
+              <a:avLst/>
+            </a:prstGeom>
+            <a:ln w="44450">
+              <a:solidFill>
+                <a:schemeClr val="accent5">
+                  <a:lumMod val="40000"/>
+                  <a:lumOff val="60000"/>
+                </a:schemeClr>
+              </a:solidFill>
+              <a:headEnd type="triangle"/>
+              <a:tailEnd type="triangle"/>
+            </a:ln>
+          </p:spPr>
+          <p:style>
+            <a:lnRef idx="2">
+              <a:schemeClr val="accent1"/>
+            </a:lnRef>
+            <a:fillRef idx="0">
+              <a:schemeClr val="accent1"/>
+            </a:fillRef>
+            <a:effectRef idx="1">
+              <a:schemeClr val="accent1"/>
+            </a:effectRef>
+            <a:fontRef idx="minor">
+              <a:schemeClr val="tx1"/>
+            </a:fontRef>
+          </p:style>
+        </p:cxnSp>
+        <p:cxnSp>
+          <p:nvCxnSpPr>
+            <p:cNvPr id="37" name="Straight Arrow Connector 36">
+              <a:extLst>
+                <a:ext uri="{FF2B5EF4-FFF2-40B4-BE49-F238E27FC236}">
+                  <a16:creationId xmlns:a16="http://schemas.microsoft.com/office/drawing/2014/main" id="{A5CA9F1A-66D2-A88B-CBB1-7A057257BA8F}"/>
+                </a:ext>
+              </a:extLst>
+            </p:cNvPr>
+            <p:cNvCxnSpPr>
+              <a:cxnSpLocks/>
+              <a:stCxn id="6" idx="3"/>
+              <a:endCxn id="7" idx="1"/>
+            </p:cNvCxnSpPr>
+            <p:nvPr/>
+          </p:nvCxnSpPr>
+          <p:spPr>
+            <a:xfrm flipV="1">
+              <a:off x="1427911" y="2672424"/>
+              <a:ext cx="3148287" cy="5521"/>
+            </a:xfrm>
+            <a:prstGeom prst="straightConnector1">
+              <a:avLst/>
+            </a:prstGeom>
+            <a:ln w="44450">
+              <a:prstDash val="dash"/>
+              <a:headEnd type="triangle"/>
+              <a:tailEnd type="triangle"/>
+            </a:ln>
+          </p:spPr>
+          <p:style>
+            <a:lnRef idx="2">
+              <a:schemeClr val="accent1"/>
+            </a:lnRef>
+            <a:fillRef idx="0">
+              <a:schemeClr val="accent1"/>
+            </a:fillRef>
+            <a:effectRef idx="1">
+              <a:schemeClr val="accent1"/>
+            </a:effectRef>
+            <a:fontRef idx="minor">
+              <a:schemeClr val="tx1"/>
+            </a:fontRef>
+          </p:style>
+        </p:cxnSp>
+        <p:pic>
+          <p:nvPicPr>
+            <p:cNvPr id="67" name="Picture 66" descr="A silhouette of a deer&#10;&#10;Description automatically generated">
+              <a:extLst>
+                <a:ext uri="{FF2B5EF4-FFF2-40B4-BE49-F238E27FC236}">
+                  <a16:creationId xmlns:a16="http://schemas.microsoft.com/office/drawing/2014/main" id="{FF9D0B46-6022-824A-70EC-931DD74FDB19}"/>
+                </a:ext>
+              </a:extLst>
+            </p:cNvPr>
+            <p:cNvPicPr>
+              <a:picLocks noChangeAspect="1"/>
+            </p:cNvPicPr>
+            <p:nvPr/>
+          </p:nvPicPr>
+          <p:blipFill>
+            <a:blip r:embed="rId4"/>
+            <a:stretch>
+              <a:fillRect/>
+            </a:stretch>
+          </p:blipFill>
+          <p:spPr>
+            <a:xfrm>
+              <a:off x="489876" y="5724395"/>
+              <a:ext cx="964902" cy="1038234"/>
+            </a:xfrm>
+            <a:prstGeom prst="rect">
+              <a:avLst/>
+            </a:prstGeom>
+          </p:spPr>
+        </p:pic>
+        <p:pic>
+          <p:nvPicPr>
+            <p:cNvPr id="68" name="Picture 67" descr="A silhouette of a deer&#10;&#10;Description automatically generated">
+              <a:extLst>
+                <a:ext uri="{FF2B5EF4-FFF2-40B4-BE49-F238E27FC236}">
+                  <a16:creationId xmlns:a16="http://schemas.microsoft.com/office/drawing/2014/main" id="{398DC078-ED64-72DB-D7D5-AF215B36DA54}"/>
+                </a:ext>
+              </a:extLst>
+            </p:cNvPr>
+            <p:cNvPicPr>
+              <a:picLocks noChangeAspect="1"/>
+            </p:cNvPicPr>
+            <p:nvPr/>
+          </p:nvPicPr>
+          <p:blipFill>
+            <a:blip r:embed="rId4"/>
+            <a:stretch>
+              <a:fillRect/>
+            </a:stretch>
+          </p:blipFill>
+          <p:spPr>
+            <a:xfrm>
+              <a:off x="4603065" y="5696014"/>
+              <a:ext cx="964902" cy="1038234"/>
+            </a:xfrm>
+            <a:prstGeom prst="rect">
+              <a:avLst/>
+            </a:prstGeom>
+          </p:spPr>
+        </p:pic>
+        <p:cxnSp>
+          <p:nvCxnSpPr>
+            <p:cNvPr id="70" name="Straight Arrow Connector 69">
+              <a:extLst>
+                <a:ext uri="{FF2B5EF4-FFF2-40B4-BE49-F238E27FC236}">
+                  <a16:creationId xmlns:a16="http://schemas.microsoft.com/office/drawing/2014/main" id="{B55764D3-E868-5240-963B-4AAB0FB128E7}"/>
+                </a:ext>
+              </a:extLst>
+            </p:cNvPr>
+            <p:cNvCxnSpPr>
+              <a:cxnSpLocks/>
+            </p:cNvCxnSpPr>
+            <p:nvPr/>
+          </p:nvCxnSpPr>
+          <p:spPr>
+            <a:xfrm flipH="1">
+              <a:off x="1067189" y="5251858"/>
+              <a:ext cx="380884" cy="571727"/>
+            </a:xfrm>
+            <a:prstGeom prst="straightConnector1">
+              <a:avLst/>
+            </a:prstGeom>
+            <a:ln w="44450">
+              <a:solidFill>
+                <a:schemeClr val="accent5">
+                  <a:lumMod val="40000"/>
+                  <a:lumOff val="60000"/>
+                </a:schemeClr>
+              </a:solidFill>
+              <a:tailEnd type="triangle"/>
+            </a:ln>
+          </p:spPr>
+          <p:style>
+            <a:lnRef idx="2">
+              <a:schemeClr val="accent1"/>
+            </a:lnRef>
+            <a:fillRef idx="0">
+              <a:schemeClr val="accent1"/>
+            </a:fillRef>
+            <a:effectRef idx="1">
+              <a:schemeClr val="accent1"/>
+            </a:effectRef>
+            <a:fontRef idx="minor">
+              <a:schemeClr val="tx1"/>
+            </a:fontRef>
+          </p:style>
+        </p:cxnSp>
+        <p:cxnSp>
+          <p:nvCxnSpPr>
+            <p:cNvPr id="71" name="Straight Arrow Connector 70">
+              <a:extLst>
+                <a:ext uri="{FF2B5EF4-FFF2-40B4-BE49-F238E27FC236}">
+                  <a16:creationId xmlns:a16="http://schemas.microsoft.com/office/drawing/2014/main" id="{4E63BB7D-A7A8-8296-90DC-E88C9ABA5B4B}"/>
+                </a:ext>
+              </a:extLst>
+            </p:cNvPr>
+            <p:cNvCxnSpPr>
+              <a:cxnSpLocks/>
+            </p:cNvCxnSpPr>
+            <p:nvPr/>
+          </p:nvCxnSpPr>
+          <p:spPr>
+            <a:xfrm>
+              <a:off x="4424222" y="5226045"/>
+              <a:ext cx="444467" cy="651013"/>
+            </a:xfrm>
+            <a:prstGeom prst="straightConnector1">
+              <a:avLst/>
+            </a:prstGeom>
+            <a:ln w="44450">
+              <a:solidFill>
+                <a:schemeClr val="accent5">
+                  <a:lumMod val="40000"/>
+                  <a:lumOff val="60000"/>
+                </a:schemeClr>
+              </a:solidFill>
+              <a:tailEnd type="triangle"/>
+            </a:ln>
+          </p:spPr>
+          <p:style>
+            <a:lnRef idx="2">
+              <a:schemeClr val="accent1"/>
+            </a:lnRef>
+            <a:fillRef idx="0">
+              <a:schemeClr val="accent1"/>
+            </a:fillRef>
+            <a:effectRef idx="1">
+              <a:schemeClr val="accent1"/>
+            </a:effectRef>
+            <a:fontRef idx="minor">
+              <a:schemeClr val="tx1"/>
+            </a:fontRef>
+          </p:style>
+        </p:cxnSp>
+        <p:cxnSp>
+          <p:nvCxnSpPr>
+            <p:cNvPr id="73" name="Straight Arrow Connector 72">
+              <a:extLst>
+                <a:ext uri="{FF2B5EF4-FFF2-40B4-BE49-F238E27FC236}">
+                  <a16:creationId xmlns:a16="http://schemas.microsoft.com/office/drawing/2014/main" id="{1FA85966-0F79-9676-4842-CF0DEF0A5443}"/>
+                </a:ext>
+              </a:extLst>
+            </p:cNvPr>
+            <p:cNvCxnSpPr>
+              <a:cxnSpLocks/>
+            </p:cNvCxnSpPr>
+            <p:nvPr/>
+          </p:nvCxnSpPr>
+          <p:spPr>
+            <a:xfrm flipV="1">
+              <a:off x="2649918" y="4754258"/>
+              <a:ext cx="664316" cy="4810"/>
+            </a:xfrm>
+            <a:prstGeom prst="straightConnector1">
+              <a:avLst/>
+            </a:prstGeom>
+            <a:ln w="44450">
+              <a:solidFill>
+                <a:schemeClr val="accent5">
+                  <a:lumMod val="40000"/>
+                  <a:lumOff val="60000"/>
+                </a:schemeClr>
+              </a:solidFill>
+              <a:headEnd type="triangle"/>
+              <a:tailEnd type="triangle"/>
+            </a:ln>
+          </p:spPr>
+          <p:style>
+            <a:lnRef idx="2">
+              <a:schemeClr val="accent1"/>
+            </a:lnRef>
+            <a:fillRef idx="0">
+              <a:schemeClr val="accent1"/>
+            </a:fillRef>
+            <a:effectRef idx="1">
+              <a:schemeClr val="accent1"/>
+            </a:effectRef>
+            <a:fontRef idx="minor">
+              <a:schemeClr val="tx1"/>
+            </a:fontRef>
+          </p:style>
+        </p:cxnSp>
+        <p:cxnSp>
+          <p:nvCxnSpPr>
+            <p:cNvPr id="74" name="Straight Arrow Connector 73">
+              <a:extLst>
+                <a:ext uri="{FF2B5EF4-FFF2-40B4-BE49-F238E27FC236}">
+                  <a16:creationId xmlns:a16="http://schemas.microsoft.com/office/drawing/2014/main" id="{9D92527C-7FCC-CE43-331A-3484288C7666}"/>
+                </a:ext>
+              </a:extLst>
+            </p:cNvPr>
+            <p:cNvCxnSpPr>
+              <a:cxnSpLocks/>
+              <a:stCxn id="67" idx="3"/>
+              <a:endCxn id="68" idx="1"/>
+            </p:cNvCxnSpPr>
+            <p:nvPr/>
+          </p:nvCxnSpPr>
+          <p:spPr>
+            <a:xfrm flipV="1">
+              <a:off x="1454778" y="6215131"/>
+              <a:ext cx="3148287" cy="28381"/>
+            </a:xfrm>
+            <a:prstGeom prst="straightConnector1">
+              <a:avLst/>
+            </a:prstGeom>
+            <a:ln w="44450">
+              <a:prstDash val="dash"/>
+              <a:headEnd type="triangle"/>
+              <a:tailEnd type="triangle"/>
+            </a:ln>
+          </p:spPr>
+          <p:style>
+            <a:lnRef idx="2">
+              <a:schemeClr val="accent1"/>
+            </a:lnRef>
+            <a:fillRef idx="0">
+              <a:schemeClr val="accent1"/>
+            </a:fillRef>
+            <a:effectRef idx="1">
+              <a:schemeClr val="accent1"/>
+            </a:effectRef>
+            <a:fontRef idx="minor">
+              <a:schemeClr val="tx1"/>
+            </a:fontRef>
+          </p:style>
+        </p:cxnSp>
+        <p:pic>
+          <p:nvPicPr>
+            <p:cNvPr id="82" name="Picture 81" descr="A silhouette of a deer&#10;&#10;Description automatically generated">
+              <a:extLst>
+                <a:ext uri="{FF2B5EF4-FFF2-40B4-BE49-F238E27FC236}">
+                  <a16:creationId xmlns:a16="http://schemas.microsoft.com/office/drawing/2014/main" id="{0B268416-CB1A-79D9-C8E7-9BD52130C804}"/>
+                </a:ext>
+              </a:extLst>
+            </p:cNvPr>
+            <p:cNvPicPr>
+              <a:picLocks noChangeAspect="1"/>
+            </p:cNvPicPr>
+            <p:nvPr/>
+          </p:nvPicPr>
+          <p:blipFill>
+            <a:blip r:embed="rId4"/>
+            <a:stretch>
+              <a:fillRect/>
+            </a:stretch>
+          </p:blipFill>
+          <p:spPr>
+            <a:xfrm>
+              <a:off x="7635516" y="5464606"/>
+              <a:ext cx="964902" cy="1038234"/>
+            </a:xfrm>
+            <a:prstGeom prst="rect">
+              <a:avLst/>
+            </a:prstGeom>
+          </p:spPr>
+        </p:pic>
+        <p:pic>
+          <p:nvPicPr>
+            <p:cNvPr id="83" name="Picture 82" descr="A black background with a black square&#10;&#10;Description automatically generated with medium confidence">
+              <a:extLst>
+                <a:ext uri="{FF2B5EF4-FFF2-40B4-BE49-F238E27FC236}">
+                  <a16:creationId xmlns:a16="http://schemas.microsoft.com/office/drawing/2014/main" id="{BE313ACE-19CF-F46B-9BC2-72FEA8BEE0AB}"/>
+                </a:ext>
+              </a:extLst>
+            </p:cNvPr>
+            <p:cNvPicPr>
+              <a:picLocks noChangeAspect="1"/>
+            </p:cNvPicPr>
+            <p:nvPr/>
+          </p:nvPicPr>
+          <p:blipFill>
+            <a:blip r:embed="rId5"/>
+            <a:stretch>
+              <a:fillRect/>
+            </a:stretch>
+          </p:blipFill>
+          <p:spPr>
+            <a:xfrm>
+              <a:off x="7357321" y="3256697"/>
+              <a:ext cx="1584021" cy="1615575"/>
+            </a:xfrm>
+            <a:prstGeom prst="rect">
+              <a:avLst/>
+            </a:prstGeom>
+          </p:spPr>
+        </p:pic>
+        <p:pic>
+          <p:nvPicPr>
+            <p:cNvPr id="84" name="Picture 83" descr="A silhouette of a deer&#10;&#10;Description automatically generated">
+              <a:extLst>
+                <a:ext uri="{FF2B5EF4-FFF2-40B4-BE49-F238E27FC236}">
+                  <a16:creationId xmlns:a16="http://schemas.microsoft.com/office/drawing/2014/main" id="{63103557-2706-BDBA-044B-81D9778914F0}"/>
+                </a:ext>
+              </a:extLst>
+            </p:cNvPr>
+            <p:cNvPicPr>
+              <a:picLocks noChangeAspect="1"/>
+            </p:cNvPicPr>
+            <p:nvPr/>
+          </p:nvPicPr>
+          <p:blipFill>
+            <a:blip r:embed="rId3"/>
+            <a:stretch>
+              <a:fillRect/>
+            </a:stretch>
+          </p:blipFill>
+          <p:spPr>
+            <a:xfrm>
+              <a:off x="7269765" y="1451417"/>
+              <a:ext cx="1765031" cy="1180744"/>
+            </a:xfrm>
+            <a:prstGeom prst="rect">
+              <a:avLst/>
+            </a:prstGeom>
+          </p:spPr>
+        </p:pic>
+        <p:cxnSp>
+          <p:nvCxnSpPr>
+            <p:cNvPr id="85" name="Curved Connector 84">
+              <a:extLst>
+                <a:ext uri="{FF2B5EF4-FFF2-40B4-BE49-F238E27FC236}">
+                  <a16:creationId xmlns:a16="http://schemas.microsoft.com/office/drawing/2014/main" id="{0ED644B6-D85C-7DB6-EA16-8D313DC3A502}"/>
+                </a:ext>
+              </a:extLst>
+            </p:cNvPr>
+            <p:cNvCxnSpPr>
+              <a:cxnSpLocks/>
+              <a:stCxn id="84" idx="1"/>
+              <a:endCxn id="83" idx="1"/>
+            </p:cNvCxnSpPr>
+            <p:nvPr/>
+          </p:nvCxnSpPr>
+          <p:spPr>
+            <a:xfrm rot="10800000" flipH="1" flipV="1">
+              <a:off x="7269765" y="2041789"/>
+              <a:ext cx="87556" cy="2022696"/>
+            </a:xfrm>
+            <a:prstGeom prst="curvedConnector3">
+              <a:avLst>
+                <a:gd name="adj1" fmla="val -793926"/>
+              </a:avLst>
+            </a:prstGeom>
+            <a:ln w="38100">
+              <a:solidFill>
+                <a:schemeClr val="accent2">
+                  <a:lumMod val="40000"/>
+                  <a:lumOff val="60000"/>
+                </a:schemeClr>
+              </a:solidFill>
+              <a:tailEnd type="triangle"/>
+            </a:ln>
+          </p:spPr>
+          <p:style>
+            <a:lnRef idx="2">
+              <a:schemeClr val="accent1"/>
+            </a:lnRef>
+            <a:fillRef idx="0">
+              <a:schemeClr val="accent1"/>
+            </a:fillRef>
+            <a:effectRef idx="1">
+              <a:schemeClr val="accent1"/>
+            </a:effectRef>
+            <a:fontRef idx="minor">
+              <a:schemeClr val="tx1"/>
+            </a:fontRef>
+          </p:style>
+        </p:cxnSp>
+        <p:cxnSp>
+          <p:nvCxnSpPr>
+            <p:cNvPr id="86" name="Curved Connector 85">
+              <a:extLst>
+                <a:ext uri="{FF2B5EF4-FFF2-40B4-BE49-F238E27FC236}">
+                  <a16:creationId xmlns:a16="http://schemas.microsoft.com/office/drawing/2014/main" id="{5E5F896C-5923-55EA-CCB6-E43971D6433B}"/>
+                </a:ext>
+              </a:extLst>
+            </p:cNvPr>
+            <p:cNvCxnSpPr>
+              <a:cxnSpLocks/>
+              <a:stCxn id="84" idx="3"/>
+              <a:endCxn id="83" idx="3"/>
+            </p:cNvCxnSpPr>
+            <p:nvPr/>
+          </p:nvCxnSpPr>
+          <p:spPr>
+            <a:xfrm flipH="1">
+              <a:off x="8941342" y="2041789"/>
+              <a:ext cx="93454" cy="2022696"/>
+            </a:xfrm>
+            <a:prstGeom prst="curvedConnector3">
+              <a:avLst>
+                <a:gd name="adj1" fmla="val -663948"/>
+              </a:avLst>
+            </a:prstGeom>
+            <a:ln w="38100">
+              <a:solidFill>
+                <a:schemeClr val="accent5">
+                  <a:lumMod val="40000"/>
+                  <a:lumOff val="60000"/>
+                </a:schemeClr>
+              </a:solidFill>
+              <a:tailEnd type="triangle"/>
+            </a:ln>
+          </p:spPr>
+          <p:style>
+            <a:lnRef idx="2">
+              <a:schemeClr val="accent1"/>
+            </a:lnRef>
+            <a:fillRef idx="0">
+              <a:schemeClr val="accent1"/>
+            </a:fillRef>
+            <a:effectRef idx="1">
+              <a:schemeClr val="accent1"/>
+            </a:effectRef>
+            <a:fontRef idx="minor">
+              <a:schemeClr val="tx1"/>
+            </a:fontRef>
+          </p:style>
+        </p:cxnSp>
+        <p:cxnSp>
+          <p:nvCxnSpPr>
+            <p:cNvPr id="87" name="Curved Connector 86">
+              <a:extLst>
+                <a:ext uri="{FF2B5EF4-FFF2-40B4-BE49-F238E27FC236}">
+                  <a16:creationId xmlns:a16="http://schemas.microsoft.com/office/drawing/2014/main" id="{28145128-DD05-5259-7A5A-D2BE4BC1A1C4}"/>
+                </a:ext>
+              </a:extLst>
+            </p:cNvPr>
+            <p:cNvCxnSpPr>
+              <a:cxnSpLocks/>
+            </p:cNvCxnSpPr>
+            <p:nvPr/>
+          </p:nvCxnSpPr>
+          <p:spPr>
+            <a:xfrm flipH="1">
+              <a:off x="8702037" y="4111140"/>
+              <a:ext cx="239305" cy="1848393"/>
+            </a:xfrm>
+            <a:prstGeom prst="curvedConnector3">
+              <a:avLst>
+                <a:gd name="adj1" fmla="val -267085"/>
+              </a:avLst>
+            </a:prstGeom>
+            <a:ln w="38100">
+              <a:solidFill>
+                <a:schemeClr val="accent5">
+                  <a:lumMod val="40000"/>
+                  <a:lumOff val="60000"/>
+                </a:schemeClr>
+              </a:solidFill>
+              <a:tailEnd type="triangle"/>
+            </a:ln>
+          </p:spPr>
+          <p:style>
+            <a:lnRef idx="2">
+              <a:schemeClr val="accent1"/>
+            </a:lnRef>
+            <a:fillRef idx="0">
+              <a:schemeClr val="accent1"/>
+            </a:fillRef>
+            <a:effectRef idx="1">
+              <a:schemeClr val="accent1"/>
+            </a:effectRef>
+            <a:fontRef idx="minor">
+              <a:schemeClr val="tx1"/>
+            </a:fontRef>
+          </p:style>
+        </p:cxnSp>
+        <p:cxnSp>
+          <p:nvCxnSpPr>
+            <p:cNvPr id="88" name="Curved Connector 87">
+              <a:extLst>
+                <a:ext uri="{FF2B5EF4-FFF2-40B4-BE49-F238E27FC236}">
+                  <a16:creationId xmlns:a16="http://schemas.microsoft.com/office/drawing/2014/main" id="{6E0E8B89-401D-EE67-444A-56AD588EEDEE}"/>
+                </a:ext>
+              </a:extLst>
+            </p:cNvPr>
+            <p:cNvCxnSpPr>
+              <a:cxnSpLocks/>
+            </p:cNvCxnSpPr>
+            <p:nvPr/>
+          </p:nvCxnSpPr>
+          <p:spPr>
+            <a:xfrm rot="5400000">
+              <a:off x="7525073" y="5208046"/>
+              <a:ext cx="907575" cy="3"/>
+            </a:xfrm>
+            <a:prstGeom prst="curvedConnector3">
+              <a:avLst>
+                <a:gd name="adj1" fmla="val 50000"/>
+              </a:avLst>
+            </a:prstGeom>
+            <a:ln w="38100">
+              <a:solidFill>
+                <a:schemeClr val="accent1"/>
+              </a:solidFill>
+              <a:prstDash val="dash"/>
+              <a:headEnd type="triangle"/>
+              <a:tailEnd type="triangle"/>
+            </a:ln>
+          </p:spPr>
+          <p:style>
+            <a:lnRef idx="2">
+              <a:schemeClr val="accent1"/>
+            </a:lnRef>
+            <a:fillRef idx="0">
+              <a:schemeClr val="accent1"/>
+            </a:fillRef>
+            <a:effectRef idx="1">
+              <a:schemeClr val="accent1"/>
+            </a:effectRef>
+            <a:fontRef idx="minor">
+              <a:schemeClr val="tx1"/>
+            </a:fontRef>
+          </p:style>
+        </p:cxnSp>
+        <p:cxnSp>
+          <p:nvCxnSpPr>
+            <p:cNvPr id="101" name="Curved Connector 100">
+              <a:extLst>
+                <a:ext uri="{FF2B5EF4-FFF2-40B4-BE49-F238E27FC236}">
+                  <a16:creationId xmlns:a16="http://schemas.microsoft.com/office/drawing/2014/main" id="{FB57822F-2BB6-CA76-B304-B6E0F87C51BE}"/>
+                </a:ext>
+              </a:extLst>
+            </p:cNvPr>
+            <p:cNvCxnSpPr>
+              <a:cxnSpLocks/>
+            </p:cNvCxnSpPr>
+            <p:nvPr/>
+          </p:nvCxnSpPr>
+          <p:spPr>
+            <a:xfrm flipH="1">
+              <a:off x="7269765" y="1997545"/>
+              <a:ext cx="1765031" cy="12700"/>
+            </a:xfrm>
+            <a:prstGeom prst="curvedConnector5">
+              <a:avLst>
+                <a:gd name="adj1" fmla="val -12952"/>
+                <a:gd name="adj2" fmla="val -8024866"/>
+                <a:gd name="adj3" fmla="val 112952"/>
+              </a:avLst>
+            </a:prstGeom>
+            <a:ln w="38100">
+              <a:solidFill>
+                <a:srgbClr val="FF7A72"/>
+              </a:solidFill>
+              <a:prstDash val="dash"/>
+              <a:headEnd type="triangle"/>
+              <a:tailEnd type="triangle"/>
+            </a:ln>
+          </p:spPr>
+          <p:style>
+            <a:lnRef idx="2">
+              <a:schemeClr val="accent1"/>
+            </a:lnRef>
+            <a:fillRef idx="0">
+              <a:schemeClr val="accent1"/>
+            </a:fillRef>
+            <a:effectRef idx="1">
+              <a:schemeClr val="accent1"/>
+            </a:effectRef>
+            <a:fontRef idx="minor">
+              <a:schemeClr val="tx1"/>
+            </a:fontRef>
+          </p:style>
+        </p:cxnSp>
+        <p:sp>
+          <p:nvSpPr>
+            <p:cNvPr id="119" name="TextBox 118">
+              <a:extLst>
+                <a:ext uri="{FF2B5EF4-FFF2-40B4-BE49-F238E27FC236}">
+                  <a16:creationId xmlns:a16="http://schemas.microsoft.com/office/drawing/2014/main" id="{E60D0AC9-34F4-6C5D-BEDC-A48AC3A24306}"/>
+                </a:ext>
+              </a:extLst>
+            </p:cNvPr>
+            <p:cNvSpPr txBox="1"/>
+            <p:nvPr/>
+          </p:nvSpPr>
+          <p:spPr>
+            <a:xfrm>
+              <a:off x="1287364" y="2785183"/>
+              <a:ext cx="3698221" cy="646331"/>
+            </a:xfrm>
+            <a:prstGeom prst="rect">
+              <a:avLst/>
+            </a:prstGeom>
+            <a:noFill/>
+          </p:spPr>
+          <p:txBody>
+            <a:bodyPr wrap="square" rtlCol="0">
+              <a:spAutoFit/>
+            </a:bodyPr>
+            <a:lstStyle/>
+            <a:p>
+              <a:pPr algn="ctr"/>
+              <a:r>
+                <a:rPr lang="en-US" dirty="0"/>
+                <a:t>0.125 V</a:t>
+              </a:r>
+              <a:r>
+                <a:rPr lang="en-US" baseline="-25000" dirty="0"/>
+                <a:t>A</a:t>
+              </a:r>
+              <a:r>
+                <a:rPr lang="en-US" dirty="0"/>
+                <a:t> + 0.5 V</a:t>
+              </a:r>
+              <a:r>
+                <a:rPr lang="en-US" baseline="-25000" dirty="0"/>
+                <a:t>MG</a:t>
+              </a:r>
+              <a:r>
+                <a:rPr lang="en-US" dirty="0"/>
+                <a:t> </a:t>
+              </a:r>
+            </a:p>
+            <a:p>
+              <a:pPr algn="ctr"/>
+              <a:r>
+                <a:rPr lang="en-US" dirty="0"/>
+                <a:t>+ 0.5 C</a:t>
+              </a:r>
+              <a:r>
+                <a:rPr lang="en-US" baseline="-25000" dirty="0"/>
+                <a:t>A,MG</a:t>
+              </a:r>
+            </a:p>
+          </p:txBody>
+        </p:sp>
+        <p:sp>
+          <p:nvSpPr>
+            <p:cNvPr id="127" name="TextBox 126">
+              <a:extLst>
+                <a:ext uri="{FF2B5EF4-FFF2-40B4-BE49-F238E27FC236}">
+                  <a16:creationId xmlns:a16="http://schemas.microsoft.com/office/drawing/2014/main" id="{B20B7562-7AB9-6FC3-4283-63C79F01335F}"/>
+                </a:ext>
+              </a:extLst>
+            </p:cNvPr>
+            <p:cNvSpPr txBox="1"/>
+            <p:nvPr/>
+          </p:nvSpPr>
+          <p:spPr>
+            <a:xfrm>
+              <a:off x="2524573" y="6315027"/>
+              <a:ext cx="1152088" cy="376087"/>
+            </a:xfrm>
+            <a:prstGeom prst="rect">
+              <a:avLst/>
+            </a:prstGeom>
+            <a:noFill/>
+          </p:spPr>
+          <p:txBody>
+            <a:bodyPr wrap="square" rtlCol="0">
+              <a:spAutoFit/>
+            </a:bodyPr>
+            <a:lstStyle/>
+            <a:p>
+              <a:r>
+                <a:rPr lang="en-US" dirty="0"/>
+                <a:t>0.125 V</a:t>
+              </a:r>
+              <a:r>
+                <a:rPr lang="en-US" baseline="-25000" dirty="0"/>
+                <a:t>A</a:t>
+              </a:r>
+              <a:endParaRPr lang="en-US" dirty="0"/>
+            </a:p>
+          </p:txBody>
+        </p:sp>
+        <p:sp>
+          <p:nvSpPr>
+            <p:cNvPr id="128" name="TextBox 127">
+              <a:extLst>
+                <a:ext uri="{FF2B5EF4-FFF2-40B4-BE49-F238E27FC236}">
+                  <a16:creationId xmlns:a16="http://schemas.microsoft.com/office/drawing/2014/main" id="{53FC76DF-5012-3C95-7368-06EA88C7C48B}"/>
+                </a:ext>
+              </a:extLst>
+            </p:cNvPr>
+            <p:cNvSpPr txBox="1"/>
+            <p:nvPr/>
+          </p:nvSpPr>
+          <p:spPr>
+            <a:xfrm>
+              <a:off x="6291141" y="4906763"/>
+              <a:ext cx="1586100" cy="646331"/>
+            </a:xfrm>
+            <a:prstGeom prst="rect">
+              <a:avLst/>
+            </a:prstGeom>
+            <a:noFill/>
+          </p:spPr>
+          <p:txBody>
+            <a:bodyPr wrap="square" rtlCol="0">
+              <a:spAutoFit/>
+            </a:bodyPr>
+            <a:lstStyle/>
+            <a:p>
+              <a:pPr algn="r"/>
+              <a:r>
+                <a:rPr lang="en-US" dirty="0"/>
+                <a:t>0.5 V</a:t>
+              </a:r>
+              <a:r>
+                <a:rPr lang="en-US" baseline="-25000" dirty="0"/>
+                <a:t>A</a:t>
+              </a:r>
+              <a:r>
+                <a:rPr lang="en-US" dirty="0"/>
+                <a:t>  +</a:t>
+              </a:r>
+            </a:p>
+            <a:p>
+              <a:pPr algn="r"/>
+              <a:r>
+                <a:rPr lang="en-US" dirty="0"/>
+                <a:t> 0.25 C</a:t>
+              </a:r>
+              <a:r>
+                <a:rPr lang="en-US" baseline="-25000" dirty="0"/>
+                <a:t>A,MG</a:t>
+              </a:r>
+              <a:endParaRPr lang="en-US" dirty="0"/>
+            </a:p>
+          </p:txBody>
+        </p:sp>
+        <p:sp>
+          <p:nvSpPr>
+            <p:cNvPr id="129" name="TextBox 128">
+              <a:extLst>
+                <a:ext uri="{FF2B5EF4-FFF2-40B4-BE49-F238E27FC236}">
+                  <a16:creationId xmlns:a16="http://schemas.microsoft.com/office/drawing/2014/main" id="{C7F3DF30-53EE-CF30-A4F9-AA18004257F3}"/>
+                </a:ext>
+              </a:extLst>
+            </p:cNvPr>
+            <p:cNvSpPr txBox="1"/>
+            <p:nvPr/>
+          </p:nvSpPr>
+          <p:spPr>
+            <a:xfrm>
+              <a:off x="7705103" y="1871548"/>
+              <a:ext cx="1671577" cy="307777"/>
+            </a:xfrm>
+            <a:prstGeom prst="rect">
+              <a:avLst/>
+            </a:prstGeom>
+            <a:noFill/>
+          </p:spPr>
+          <p:txBody>
+            <a:bodyPr wrap="square" rtlCol="0">
+              <a:spAutoFit/>
+            </a:bodyPr>
+            <a:lstStyle/>
+            <a:p>
+              <a:r>
+                <a:rPr lang="en-US" sz="1400" dirty="0">
+                  <a:solidFill>
+                    <a:schemeClr val="bg1"/>
+                  </a:solidFill>
+                </a:rPr>
+                <a:t>Grandmother</a:t>
+              </a:r>
+            </a:p>
+          </p:txBody>
+        </p:sp>
+        <p:sp>
+          <p:nvSpPr>
+            <p:cNvPr id="131" name="TextBox 130">
+              <a:extLst>
+                <a:ext uri="{FF2B5EF4-FFF2-40B4-BE49-F238E27FC236}">
+                  <a16:creationId xmlns:a16="http://schemas.microsoft.com/office/drawing/2014/main" id="{6FE1A45F-4E9A-9752-67A6-48E217531790}"/>
+                </a:ext>
+              </a:extLst>
+            </p:cNvPr>
+            <p:cNvSpPr txBox="1"/>
+            <p:nvPr/>
+          </p:nvSpPr>
+          <p:spPr>
+            <a:xfrm>
+              <a:off x="3952178" y="808590"/>
+              <a:ext cx="781839" cy="307777"/>
+            </a:xfrm>
+            <a:prstGeom prst="rect">
+              <a:avLst/>
+            </a:prstGeom>
+            <a:noFill/>
+          </p:spPr>
+          <p:txBody>
+            <a:bodyPr wrap="square" rtlCol="0">
+              <a:spAutoFit/>
+            </a:bodyPr>
+            <a:lstStyle/>
+            <a:p>
+              <a:r>
+                <a:rPr lang="en-US" sz="1400" dirty="0">
+                  <a:solidFill>
+                    <a:schemeClr val="bg1"/>
+                  </a:solidFill>
+                </a:rPr>
+                <a:t>Aunt</a:t>
+              </a:r>
+            </a:p>
+          </p:txBody>
+        </p:sp>
+        <p:sp>
+          <p:nvSpPr>
+            <p:cNvPr id="132" name="TextBox 131">
+              <a:extLst>
+                <a:ext uri="{FF2B5EF4-FFF2-40B4-BE49-F238E27FC236}">
+                  <a16:creationId xmlns:a16="http://schemas.microsoft.com/office/drawing/2014/main" id="{33A80D85-1907-9558-53AA-83A6BB81CBA0}"/>
+                </a:ext>
+              </a:extLst>
+            </p:cNvPr>
+            <p:cNvSpPr txBox="1"/>
+            <p:nvPr/>
+          </p:nvSpPr>
+          <p:spPr>
+            <a:xfrm>
+              <a:off x="4664275" y="2450248"/>
+              <a:ext cx="811835" cy="307777"/>
+            </a:xfrm>
+            <a:prstGeom prst="rect">
+              <a:avLst/>
+            </a:prstGeom>
+            <a:noFill/>
+          </p:spPr>
+          <p:txBody>
+            <a:bodyPr wrap="square" rtlCol="0">
+              <a:spAutoFit/>
+            </a:bodyPr>
+            <a:lstStyle/>
+            <a:p>
+              <a:r>
+                <a:rPr lang="en-US" sz="1400" dirty="0">
+                  <a:solidFill>
+                    <a:schemeClr val="bg1"/>
+                  </a:solidFill>
+                </a:rPr>
+                <a:t>Cousin</a:t>
+              </a:r>
+            </a:p>
+          </p:txBody>
+        </p:sp>
+        <p:sp>
+          <p:nvSpPr>
+            <p:cNvPr id="133" name="TextBox 132">
+              <a:extLst>
+                <a:ext uri="{FF2B5EF4-FFF2-40B4-BE49-F238E27FC236}">
+                  <a16:creationId xmlns:a16="http://schemas.microsoft.com/office/drawing/2014/main" id="{D91EE373-E3BC-9CDE-45B6-2D1FD5313728}"/>
+                </a:ext>
+              </a:extLst>
+            </p:cNvPr>
+            <p:cNvSpPr txBox="1"/>
+            <p:nvPr/>
+          </p:nvSpPr>
+          <p:spPr>
+            <a:xfrm>
+              <a:off x="1567462" y="789776"/>
+              <a:ext cx="754928" cy="307777"/>
+            </a:xfrm>
+            <a:prstGeom prst="rect">
+              <a:avLst/>
+            </a:prstGeom>
+            <a:noFill/>
+          </p:spPr>
+          <p:txBody>
+            <a:bodyPr wrap="square" rtlCol="0">
+              <a:spAutoFit/>
+            </a:bodyPr>
+            <a:lstStyle/>
+            <a:p>
+              <a:r>
+                <a:rPr lang="en-US" sz="1400" dirty="0">
+                  <a:solidFill>
+                    <a:schemeClr val="bg1"/>
+                  </a:solidFill>
+                </a:rPr>
+                <a:t>Mother</a:t>
+              </a:r>
+            </a:p>
+          </p:txBody>
+        </p:sp>
+        <p:sp>
+          <p:nvSpPr>
+            <p:cNvPr id="134" name="TextBox 133">
+              <a:extLst>
+                <a:ext uri="{FF2B5EF4-FFF2-40B4-BE49-F238E27FC236}">
+                  <a16:creationId xmlns:a16="http://schemas.microsoft.com/office/drawing/2014/main" id="{5C1BD17A-FFD7-E889-250B-1A533F4938AD}"/>
+                </a:ext>
+              </a:extLst>
+            </p:cNvPr>
+            <p:cNvSpPr txBox="1"/>
+            <p:nvPr/>
+          </p:nvSpPr>
+          <p:spPr>
+            <a:xfrm>
+              <a:off x="4691142" y="5988699"/>
+              <a:ext cx="811835" cy="307777"/>
+            </a:xfrm>
+            <a:prstGeom prst="rect">
+              <a:avLst/>
+            </a:prstGeom>
+            <a:noFill/>
+          </p:spPr>
+          <p:txBody>
+            <a:bodyPr wrap="square" rtlCol="0">
+              <a:spAutoFit/>
+            </a:bodyPr>
+            <a:lstStyle/>
+            <a:p>
+              <a:r>
+                <a:rPr lang="en-US" sz="1400" dirty="0">
+                  <a:solidFill>
+                    <a:schemeClr val="bg1"/>
+                  </a:solidFill>
+                </a:rPr>
+                <a:t>Cousin</a:t>
+              </a:r>
+            </a:p>
+          </p:txBody>
+        </p:sp>
+        <p:sp>
+          <p:nvSpPr>
+            <p:cNvPr id="135" name="TextBox 134">
+              <a:extLst>
+                <a:ext uri="{FF2B5EF4-FFF2-40B4-BE49-F238E27FC236}">
+                  <a16:creationId xmlns:a16="http://schemas.microsoft.com/office/drawing/2014/main" id="{0CC5F275-AAA6-8946-F579-CD1B930429AC}"/>
+                </a:ext>
+              </a:extLst>
+            </p:cNvPr>
+            <p:cNvSpPr txBox="1"/>
+            <p:nvPr/>
+          </p:nvSpPr>
+          <p:spPr>
+            <a:xfrm>
+              <a:off x="3737518" y="4499923"/>
+              <a:ext cx="781839" cy="307777"/>
+            </a:xfrm>
+            <a:prstGeom prst="rect">
+              <a:avLst/>
+            </a:prstGeom>
+            <a:noFill/>
+          </p:spPr>
+          <p:txBody>
+            <a:bodyPr wrap="square" rtlCol="0">
+              <a:spAutoFit/>
+            </a:bodyPr>
+            <a:lstStyle/>
+            <a:p>
+              <a:r>
+                <a:rPr lang="en-US" sz="1400" dirty="0">
+                  <a:solidFill>
+                    <a:schemeClr val="bg1"/>
+                  </a:solidFill>
+                </a:rPr>
+                <a:t>Uncle</a:t>
+              </a:r>
+            </a:p>
+          </p:txBody>
+        </p:sp>
+        <p:sp>
+          <p:nvSpPr>
+            <p:cNvPr id="136" name="TextBox 135">
+              <a:extLst>
+                <a:ext uri="{FF2B5EF4-FFF2-40B4-BE49-F238E27FC236}">
+                  <a16:creationId xmlns:a16="http://schemas.microsoft.com/office/drawing/2014/main" id="{7F69EED2-0D5B-E689-9FB6-8CFC7AC52174}"/>
+                </a:ext>
+              </a:extLst>
+            </p:cNvPr>
+            <p:cNvSpPr txBox="1"/>
+            <p:nvPr/>
+          </p:nvSpPr>
+          <p:spPr>
+            <a:xfrm>
+              <a:off x="1497720" y="4482941"/>
+              <a:ext cx="754928" cy="307777"/>
+            </a:xfrm>
+            <a:prstGeom prst="rect">
+              <a:avLst/>
+            </a:prstGeom>
+            <a:noFill/>
+          </p:spPr>
+          <p:txBody>
+            <a:bodyPr wrap="square" rtlCol="0">
+              <a:spAutoFit/>
+            </a:bodyPr>
+            <a:lstStyle/>
+            <a:p>
+              <a:r>
+                <a:rPr lang="en-US" sz="1400" dirty="0">
+                  <a:solidFill>
+                    <a:schemeClr val="bg1"/>
+                  </a:solidFill>
+                </a:rPr>
+                <a:t>Father</a:t>
+              </a:r>
+            </a:p>
+          </p:txBody>
+        </p:sp>
+        <p:sp>
+          <p:nvSpPr>
+            <p:cNvPr id="158" name="TextBox 157">
+              <a:extLst>
+                <a:ext uri="{FF2B5EF4-FFF2-40B4-BE49-F238E27FC236}">
+                  <a16:creationId xmlns:a16="http://schemas.microsoft.com/office/drawing/2014/main" id="{8EF446A4-9529-247F-AD56-178515B0B005}"/>
+                </a:ext>
+              </a:extLst>
+            </p:cNvPr>
+            <p:cNvSpPr txBox="1"/>
+            <p:nvPr/>
+          </p:nvSpPr>
+          <p:spPr>
+            <a:xfrm>
+              <a:off x="7734052" y="4042549"/>
+              <a:ext cx="754928" cy="307777"/>
+            </a:xfrm>
+            <a:prstGeom prst="rect">
+              <a:avLst/>
+            </a:prstGeom>
+            <a:noFill/>
+          </p:spPr>
+          <p:txBody>
+            <a:bodyPr wrap="square" rtlCol="0">
+              <a:spAutoFit/>
+            </a:bodyPr>
+            <a:lstStyle/>
+            <a:p>
+              <a:r>
+                <a:rPr lang="en-US" sz="1400" dirty="0">
+                  <a:solidFill>
+                    <a:schemeClr val="bg1"/>
+                  </a:solidFill>
+                </a:rPr>
+                <a:t>Father</a:t>
+              </a:r>
+            </a:p>
+          </p:txBody>
+        </p:sp>
+        <p:sp>
+          <p:nvSpPr>
+            <p:cNvPr id="159" name="TextBox 158">
+              <a:extLst>
+                <a:ext uri="{FF2B5EF4-FFF2-40B4-BE49-F238E27FC236}">
+                  <a16:creationId xmlns:a16="http://schemas.microsoft.com/office/drawing/2014/main" id="{6485E05D-B4A3-3FE7-148F-26D3F03457FE}"/>
+                </a:ext>
+              </a:extLst>
+            </p:cNvPr>
+            <p:cNvSpPr txBox="1"/>
+            <p:nvPr/>
+          </p:nvSpPr>
+          <p:spPr>
+            <a:xfrm>
+              <a:off x="460056" y="307910"/>
+              <a:ext cx="475769" cy="369332"/>
+            </a:xfrm>
+            <a:prstGeom prst="rect">
+              <a:avLst/>
+            </a:prstGeom>
+            <a:noFill/>
+          </p:spPr>
+          <p:txBody>
+            <a:bodyPr wrap="square" rtlCol="0">
+              <a:spAutoFit/>
+            </a:bodyPr>
+            <a:lstStyle/>
+            <a:p>
+              <a:r>
+                <a:rPr lang="en-US" dirty="0"/>
+                <a:t>A)</a:t>
+              </a:r>
+            </a:p>
+          </p:txBody>
+        </p:sp>
+        <p:sp>
+          <p:nvSpPr>
+            <p:cNvPr id="160" name="TextBox 159">
+              <a:extLst>
+                <a:ext uri="{FF2B5EF4-FFF2-40B4-BE49-F238E27FC236}">
+                  <a16:creationId xmlns:a16="http://schemas.microsoft.com/office/drawing/2014/main" id="{B67EABD7-68A2-6D58-91E9-5F8138945DBC}"/>
+                </a:ext>
+              </a:extLst>
+            </p:cNvPr>
+            <p:cNvSpPr txBox="1"/>
+            <p:nvPr/>
+          </p:nvSpPr>
+          <p:spPr>
+            <a:xfrm>
+              <a:off x="601589" y="4164492"/>
+              <a:ext cx="475769" cy="369332"/>
+            </a:xfrm>
+            <a:prstGeom prst="rect">
+              <a:avLst/>
+            </a:prstGeom>
+            <a:noFill/>
+          </p:spPr>
+          <p:txBody>
+            <a:bodyPr wrap="square" rtlCol="0">
+              <a:spAutoFit/>
+            </a:bodyPr>
+            <a:lstStyle/>
+            <a:p>
+              <a:r>
+                <a:rPr lang="en-US" dirty="0"/>
+                <a:t>B)</a:t>
+              </a:r>
+            </a:p>
+          </p:txBody>
+        </p:sp>
+        <p:sp>
+          <p:nvSpPr>
+            <p:cNvPr id="161" name="TextBox 160">
+              <a:extLst>
+                <a:ext uri="{FF2B5EF4-FFF2-40B4-BE49-F238E27FC236}">
+                  <a16:creationId xmlns:a16="http://schemas.microsoft.com/office/drawing/2014/main" id="{1417974F-0E07-0AC6-7DAE-A9C42EBA5B5F}"/>
+                </a:ext>
+              </a:extLst>
+            </p:cNvPr>
+            <p:cNvSpPr txBox="1"/>
+            <p:nvPr/>
+          </p:nvSpPr>
+          <p:spPr>
+            <a:xfrm>
+              <a:off x="6371480" y="969611"/>
+              <a:ext cx="475769" cy="369332"/>
+            </a:xfrm>
+            <a:prstGeom prst="rect">
+              <a:avLst/>
+            </a:prstGeom>
+            <a:noFill/>
+          </p:spPr>
+          <p:txBody>
+            <a:bodyPr wrap="square" rtlCol="0">
+              <a:spAutoFit/>
+            </a:bodyPr>
+            <a:lstStyle/>
+            <a:p>
+              <a:r>
+                <a:rPr lang="en-US" dirty="0"/>
+                <a:t>C)</a:t>
+              </a:r>
+            </a:p>
+          </p:txBody>
+        </p:sp>
+        <p:sp>
+          <p:nvSpPr>
+            <p:cNvPr id="181" name="TextBox 180">
+              <a:extLst>
+                <a:ext uri="{FF2B5EF4-FFF2-40B4-BE49-F238E27FC236}">
+                  <a16:creationId xmlns:a16="http://schemas.microsoft.com/office/drawing/2014/main" id="{A2FFAE7D-69EA-D883-82EE-C3A4285A1D3D}"/>
+                </a:ext>
+              </a:extLst>
+            </p:cNvPr>
+            <p:cNvSpPr txBox="1"/>
+            <p:nvPr/>
+          </p:nvSpPr>
+          <p:spPr>
+            <a:xfrm>
+              <a:off x="625948" y="6036138"/>
+              <a:ext cx="811835" cy="307777"/>
+            </a:xfrm>
+            <a:prstGeom prst="rect">
+              <a:avLst/>
+            </a:prstGeom>
+            <a:noFill/>
+          </p:spPr>
+          <p:txBody>
+            <a:bodyPr wrap="square" rtlCol="0">
+              <a:spAutoFit/>
+            </a:bodyPr>
+            <a:lstStyle/>
+            <a:p>
+              <a:r>
+                <a:rPr lang="en-US" sz="1400" dirty="0">
+                  <a:solidFill>
+                    <a:schemeClr val="bg1"/>
+                  </a:solidFill>
+                </a:rPr>
+                <a:t>Focal</a:t>
+              </a:r>
+            </a:p>
+          </p:txBody>
+        </p:sp>
+        <p:sp>
+          <p:nvSpPr>
+            <p:cNvPr id="182" name="TextBox 181">
+              <a:extLst>
+                <a:ext uri="{FF2B5EF4-FFF2-40B4-BE49-F238E27FC236}">
+                  <a16:creationId xmlns:a16="http://schemas.microsoft.com/office/drawing/2014/main" id="{2E716739-F62E-E479-FDE5-C4008864AA2B}"/>
+                </a:ext>
+              </a:extLst>
+            </p:cNvPr>
+            <p:cNvSpPr txBox="1"/>
+            <p:nvPr/>
+          </p:nvSpPr>
+          <p:spPr>
+            <a:xfrm>
+              <a:off x="588078" y="2485217"/>
+              <a:ext cx="811835" cy="307777"/>
+            </a:xfrm>
+            <a:prstGeom prst="rect">
+              <a:avLst/>
+            </a:prstGeom>
+            <a:noFill/>
+          </p:spPr>
+          <p:txBody>
+            <a:bodyPr wrap="square" rtlCol="0">
+              <a:spAutoFit/>
+            </a:bodyPr>
+            <a:lstStyle/>
+            <a:p>
+              <a:r>
+                <a:rPr lang="en-US" sz="1400" dirty="0">
+                  <a:solidFill>
+                    <a:schemeClr val="bg1"/>
+                  </a:solidFill>
+                </a:rPr>
+                <a:t>Focal</a:t>
+              </a:r>
+            </a:p>
+          </p:txBody>
+        </p:sp>
+        <p:sp>
+          <p:nvSpPr>
+            <p:cNvPr id="183" name="TextBox 182">
+              <a:extLst>
+                <a:ext uri="{FF2B5EF4-FFF2-40B4-BE49-F238E27FC236}">
+                  <a16:creationId xmlns:a16="http://schemas.microsoft.com/office/drawing/2014/main" id="{DA2633FB-D73D-B874-25F2-238096738C7A}"/>
+                </a:ext>
+              </a:extLst>
+            </p:cNvPr>
+            <p:cNvSpPr txBox="1"/>
+            <p:nvPr/>
+          </p:nvSpPr>
+          <p:spPr>
+            <a:xfrm>
+              <a:off x="7783673" y="5774560"/>
+              <a:ext cx="811835" cy="307777"/>
+            </a:xfrm>
+            <a:prstGeom prst="rect">
+              <a:avLst/>
+            </a:prstGeom>
+            <a:noFill/>
+          </p:spPr>
+          <p:txBody>
+            <a:bodyPr wrap="square" rtlCol="0">
+              <a:spAutoFit/>
+            </a:bodyPr>
+            <a:lstStyle/>
+            <a:p>
+              <a:r>
+                <a:rPr lang="en-US" sz="1400" dirty="0">
+                  <a:solidFill>
+                    <a:schemeClr val="bg1"/>
+                  </a:solidFill>
+                </a:rPr>
+                <a:t>Focal</a:t>
+              </a:r>
+            </a:p>
+          </p:txBody>
+        </p:sp>
+      </p:grpSp>
     </p:spTree>
     <p:extLst>
       <p:ext uri="{BB962C8B-B14F-4D97-AF65-F5344CB8AC3E}">

</xml_diff>